<commit_message>
worked on slides more
</commit_message>
<xml_diff>
--- a/dojo3.pptx
+++ b/dojo3.pptx
@@ -4,6 +4,9 @@
   <p:sldMasterIdLst>
     <p:sldMasterId id="2147483648" r:id="rId1"/>
   </p:sldMasterIdLst>
+  <p:notesMasterIdLst>
+    <p:notesMasterId r:id="rId17"/>
+  </p:notesMasterIdLst>
   <p:sldIdLst>
     <p:sldId id="256" r:id="rId2"/>
     <p:sldId id="257" r:id="rId3"/>
@@ -12,11 +15,14 @@
     <p:sldId id="265" r:id="rId6"/>
     <p:sldId id="260" r:id="rId7"/>
     <p:sldId id="259" r:id="rId8"/>
-    <p:sldId id="261" r:id="rId9"/>
-    <p:sldId id="266" r:id="rId10"/>
-    <p:sldId id="268" r:id="rId11"/>
-    <p:sldId id="267" r:id="rId12"/>
-    <p:sldId id="262" r:id="rId13"/>
+    <p:sldId id="269" r:id="rId9"/>
+    <p:sldId id="261" r:id="rId10"/>
+    <p:sldId id="270" r:id="rId11"/>
+    <p:sldId id="271" r:id="rId12"/>
+    <p:sldId id="272" r:id="rId13"/>
+    <p:sldId id="268" r:id="rId14"/>
+    <p:sldId id="267" r:id="rId15"/>
+    <p:sldId id="262" r:id="rId16"/>
   </p:sldIdLst>
   <p:sldSz cx="9144000" cy="6858000" type="screen4x3"/>
   <p:notesSz cx="6858000" cy="9144000"/>
@@ -118,6 +124,515 @@
 </p:presentation>
 </file>
 
+<file path=ppt/notesMasters/notesMaster1.xml><?xml version="1.0" encoding="utf-8"?>
+<p:notesMaster xmlns:a="http://schemas.openxmlformats.org/drawingml/2006/main" xmlns:r="http://schemas.openxmlformats.org/officeDocument/2006/relationships" xmlns:p="http://schemas.openxmlformats.org/presentationml/2006/main">
+  <p:cSld>
+    <p:bg>
+      <p:bgRef idx="1001">
+        <a:schemeClr val="bg1"/>
+      </p:bgRef>
+    </p:bg>
+    <p:spTree>
+      <p:nvGrpSpPr>
+        <p:cNvPr id="1" name=""/>
+        <p:cNvGrpSpPr/>
+        <p:nvPr/>
+      </p:nvGrpSpPr>
+      <p:grpSpPr>
+        <a:xfrm>
+          <a:off x="0" y="0"/>
+          <a:ext cx="0" cy="0"/>
+          <a:chOff x="0" y="0"/>
+          <a:chExt cx="0" cy="0"/>
+        </a:xfrm>
+      </p:grpSpPr>
+      <p:sp>
+        <p:nvSpPr>
+          <p:cNvPr id="2" name="Header Placeholder 1"/>
+          <p:cNvSpPr>
+            <a:spLocks noGrp="1"/>
+          </p:cNvSpPr>
+          <p:nvPr>
+            <p:ph type="hdr" sz="quarter"/>
+          </p:nvPr>
+        </p:nvSpPr>
+        <p:spPr>
+          <a:xfrm>
+            <a:off x="0" y="0"/>
+            <a:ext cx="2971800" cy="457200"/>
+          </a:xfrm>
+          <a:prstGeom prst="rect">
+            <a:avLst/>
+          </a:prstGeom>
+        </p:spPr>
+        <p:txBody>
+          <a:bodyPr vert="horz" lIns="91440" tIns="45720" rIns="91440" bIns="45720" rtlCol="0"/>
+          <a:lstStyle>
+            <a:lvl1pPr algn="l">
+              <a:defRPr sz="1200"/>
+            </a:lvl1pPr>
+          </a:lstStyle>
+          <a:p>
+            <a:endParaRPr lang="en-US"/>
+          </a:p>
+        </p:txBody>
+      </p:sp>
+      <p:sp>
+        <p:nvSpPr>
+          <p:cNvPr id="3" name="Date Placeholder 2"/>
+          <p:cNvSpPr>
+            <a:spLocks noGrp="1"/>
+          </p:cNvSpPr>
+          <p:nvPr>
+            <p:ph type="dt" idx="1"/>
+          </p:nvPr>
+        </p:nvSpPr>
+        <p:spPr>
+          <a:xfrm>
+            <a:off x="3884613" y="0"/>
+            <a:ext cx="2971800" cy="457200"/>
+          </a:xfrm>
+          <a:prstGeom prst="rect">
+            <a:avLst/>
+          </a:prstGeom>
+        </p:spPr>
+        <p:txBody>
+          <a:bodyPr vert="horz" lIns="91440" tIns="45720" rIns="91440" bIns="45720" rtlCol="0"/>
+          <a:lstStyle>
+            <a:lvl1pPr algn="r">
+              <a:defRPr sz="1200"/>
+            </a:lvl1pPr>
+          </a:lstStyle>
+          <a:p>
+            <a:fld id="{30B443CC-0477-482F-8F38-C4E25A06AFE7}" type="datetimeFigureOut">
+              <a:rPr lang="en-US" smtClean="0"/>
+              <a:t>6/18/2014</a:t>
+            </a:fld>
+            <a:endParaRPr lang="en-US"/>
+          </a:p>
+        </p:txBody>
+      </p:sp>
+      <p:sp>
+        <p:nvSpPr>
+          <p:cNvPr id="4" name="Slide Image Placeholder 3"/>
+          <p:cNvSpPr>
+            <a:spLocks noGrp="1" noRot="1" noChangeAspect="1"/>
+          </p:cNvSpPr>
+          <p:nvPr>
+            <p:ph type="sldImg" idx="2"/>
+          </p:nvPr>
+        </p:nvSpPr>
+        <p:spPr>
+          <a:xfrm>
+            <a:off x="1143000" y="685800"/>
+            <a:ext cx="4572000" cy="3429000"/>
+          </a:xfrm>
+          <a:prstGeom prst="rect">
+            <a:avLst/>
+          </a:prstGeom>
+          <a:noFill/>
+          <a:ln w="12700">
+            <a:solidFill>
+              <a:prstClr val="black"/>
+            </a:solidFill>
+          </a:ln>
+        </p:spPr>
+        <p:txBody>
+          <a:bodyPr vert="horz" lIns="91440" tIns="45720" rIns="91440" bIns="45720" rtlCol="0" anchor="ctr"/>
+          <a:lstStyle/>
+          <a:p>
+            <a:endParaRPr lang="en-US"/>
+          </a:p>
+        </p:txBody>
+      </p:sp>
+      <p:sp>
+        <p:nvSpPr>
+          <p:cNvPr id="5" name="Notes Placeholder 4"/>
+          <p:cNvSpPr>
+            <a:spLocks noGrp="1"/>
+          </p:cNvSpPr>
+          <p:nvPr>
+            <p:ph type="body" sz="quarter" idx="3"/>
+          </p:nvPr>
+        </p:nvSpPr>
+        <p:spPr>
+          <a:xfrm>
+            <a:off x="685800" y="4343400"/>
+            <a:ext cx="5486400" cy="4114800"/>
+          </a:xfrm>
+          <a:prstGeom prst="rect">
+            <a:avLst/>
+          </a:prstGeom>
+        </p:spPr>
+        <p:txBody>
+          <a:bodyPr vert="horz" lIns="91440" tIns="45720" rIns="91440" bIns="45720" rtlCol="0">
+            <a:normAutofit/>
+          </a:bodyPr>
+          <a:lstStyle/>
+          <a:p>
+            <a:pPr lvl="0"/>
+            <a:r>
+              <a:rPr lang="en-US" smtClean="0"/>
+              <a:t>Click to edit Master text styles</a:t>
+            </a:r>
+          </a:p>
+          <a:p>
+            <a:pPr lvl="1"/>
+            <a:r>
+              <a:rPr lang="en-US" smtClean="0"/>
+              <a:t>Second level</a:t>
+            </a:r>
+          </a:p>
+          <a:p>
+            <a:pPr lvl="2"/>
+            <a:r>
+              <a:rPr lang="en-US" smtClean="0"/>
+              <a:t>Third level</a:t>
+            </a:r>
+          </a:p>
+          <a:p>
+            <a:pPr lvl="3"/>
+            <a:r>
+              <a:rPr lang="en-US" smtClean="0"/>
+              <a:t>Fourth level</a:t>
+            </a:r>
+          </a:p>
+          <a:p>
+            <a:pPr lvl="4"/>
+            <a:r>
+              <a:rPr lang="en-US" smtClean="0"/>
+              <a:t>Fifth level</a:t>
+            </a:r>
+            <a:endParaRPr lang="en-US"/>
+          </a:p>
+        </p:txBody>
+      </p:sp>
+      <p:sp>
+        <p:nvSpPr>
+          <p:cNvPr id="6" name="Footer Placeholder 5"/>
+          <p:cNvSpPr>
+            <a:spLocks noGrp="1"/>
+          </p:cNvSpPr>
+          <p:nvPr>
+            <p:ph type="ftr" sz="quarter" idx="4"/>
+          </p:nvPr>
+        </p:nvSpPr>
+        <p:spPr>
+          <a:xfrm>
+            <a:off x="0" y="8685213"/>
+            <a:ext cx="2971800" cy="457200"/>
+          </a:xfrm>
+          <a:prstGeom prst="rect">
+            <a:avLst/>
+          </a:prstGeom>
+        </p:spPr>
+        <p:txBody>
+          <a:bodyPr vert="horz" lIns="91440" tIns="45720" rIns="91440" bIns="45720" rtlCol="0" anchor="b"/>
+          <a:lstStyle>
+            <a:lvl1pPr algn="l">
+              <a:defRPr sz="1200"/>
+            </a:lvl1pPr>
+          </a:lstStyle>
+          <a:p>
+            <a:endParaRPr lang="en-US"/>
+          </a:p>
+        </p:txBody>
+      </p:sp>
+      <p:sp>
+        <p:nvSpPr>
+          <p:cNvPr id="7" name="Slide Number Placeholder 6"/>
+          <p:cNvSpPr>
+            <a:spLocks noGrp="1"/>
+          </p:cNvSpPr>
+          <p:nvPr>
+            <p:ph type="sldNum" sz="quarter" idx="5"/>
+          </p:nvPr>
+        </p:nvSpPr>
+        <p:spPr>
+          <a:xfrm>
+            <a:off x="3884613" y="8685213"/>
+            <a:ext cx="2971800" cy="457200"/>
+          </a:xfrm>
+          <a:prstGeom prst="rect">
+            <a:avLst/>
+          </a:prstGeom>
+        </p:spPr>
+        <p:txBody>
+          <a:bodyPr vert="horz" lIns="91440" tIns="45720" rIns="91440" bIns="45720" rtlCol="0" anchor="b"/>
+          <a:lstStyle>
+            <a:lvl1pPr algn="r">
+              <a:defRPr sz="1200"/>
+            </a:lvl1pPr>
+          </a:lstStyle>
+          <a:p>
+            <a:fld id="{C83EBA45-849A-47A7-9B7D-A6A1B7B72BD9}" type="slidenum">
+              <a:rPr lang="en-US" smtClean="0"/>
+              <a:t>‹#›</a:t>
+            </a:fld>
+            <a:endParaRPr lang="en-US"/>
+          </a:p>
+        </p:txBody>
+      </p:sp>
+    </p:spTree>
+  </p:cSld>
+  <p:clrMap bg1="lt1" tx1="dk1" bg2="lt2" tx2="dk2" accent1="accent1" accent2="accent2" accent3="accent3" accent4="accent4" accent5="accent5" accent6="accent6" hlink="hlink" folHlink="folHlink"/>
+  <p:notesStyle>
+    <a:lvl1pPr marL="0" algn="l" defTabSz="914400" rtl="0" eaLnBrk="1" latinLnBrk="0" hangingPunct="1">
+      <a:defRPr sz="1200" kern="1200">
+        <a:solidFill>
+          <a:schemeClr val="tx1"/>
+        </a:solidFill>
+        <a:latin typeface="+mn-lt"/>
+        <a:ea typeface="+mn-ea"/>
+        <a:cs typeface="+mn-cs"/>
+      </a:defRPr>
+    </a:lvl1pPr>
+    <a:lvl2pPr marL="457200" algn="l" defTabSz="914400" rtl="0" eaLnBrk="1" latinLnBrk="0" hangingPunct="1">
+      <a:defRPr sz="1200" kern="1200">
+        <a:solidFill>
+          <a:schemeClr val="tx1"/>
+        </a:solidFill>
+        <a:latin typeface="+mn-lt"/>
+        <a:ea typeface="+mn-ea"/>
+        <a:cs typeface="+mn-cs"/>
+      </a:defRPr>
+    </a:lvl2pPr>
+    <a:lvl3pPr marL="914400" algn="l" defTabSz="914400" rtl="0" eaLnBrk="1" latinLnBrk="0" hangingPunct="1">
+      <a:defRPr sz="1200" kern="1200">
+        <a:solidFill>
+          <a:schemeClr val="tx1"/>
+        </a:solidFill>
+        <a:latin typeface="+mn-lt"/>
+        <a:ea typeface="+mn-ea"/>
+        <a:cs typeface="+mn-cs"/>
+      </a:defRPr>
+    </a:lvl3pPr>
+    <a:lvl4pPr marL="1371600" algn="l" defTabSz="914400" rtl="0" eaLnBrk="1" latinLnBrk="0" hangingPunct="1">
+      <a:defRPr sz="1200" kern="1200">
+        <a:solidFill>
+          <a:schemeClr val="tx1"/>
+        </a:solidFill>
+        <a:latin typeface="+mn-lt"/>
+        <a:ea typeface="+mn-ea"/>
+        <a:cs typeface="+mn-cs"/>
+      </a:defRPr>
+    </a:lvl4pPr>
+    <a:lvl5pPr marL="1828800" algn="l" defTabSz="914400" rtl="0" eaLnBrk="1" latinLnBrk="0" hangingPunct="1">
+      <a:defRPr sz="1200" kern="1200">
+        <a:solidFill>
+          <a:schemeClr val="tx1"/>
+        </a:solidFill>
+        <a:latin typeface="+mn-lt"/>
+        <a:ea typeface="+mn-ea"/>
+        <a:cs typeface="+mn-cs"/>
+      </a:defRPr>
+    </a:lvl5pPr>
+    <a:lvl6pPr marL="2286000" algn="l" defTabSz="914400" rtl="0" eaLnBrk="1" latinLnBrk="0" hangingPunct="1">
+      <a:defRPr sz="1200" kern="1200">
+        <a:solidFill>
+          <a:schemeClr val="tx1"/>
+        </a:solidFill>
+        <a:latin typeface="+mn-lt"/>
+        <a:ea typeface="+mn-ea"/>
+        <a:cs typeface="+mn-cs"/>
+      </a:defRPr>
+    </a:lvl6pPr>
+    <a:lvl7pPr marL="2743200" algn="l" defTabSz="914400" rtl="0" eaLnBrk="1" latinLnBrk="0" hangingPunct="1">
+      <a:defRPr sz="1200" kern="1200">
+        <a:solidFill>
+          <a:schemeClr val="tx1"/>
+        </a:solidFill>
+        <a:latin typeface="+mn-lt"/>
+        <a:ea typeface="+mn-ea"/>
+        <a:cs typeface="+mn-cs"/>
+      </a:defRPr>
+    </a:lvl7pPr>
+    <a:lvl8pPr marL="3200400" algn="l" defTabSz="914400" rtl="0" eaLnBrk="1" latinLnBrk="0" hangingPunct="1">
+      <a:defRPr sz="1200" kern="1200">
+        <a:solidFill>
+          <a:schemeClr val="tx1"/>
+        </a:solidFill>
+        <a:latin typeface="+mn-lt"/>
+        <a:ea typeface="+mn-ea"/>
+        <a:cs typeface="+mn-cs"/>
+      </a:defRPr>
+    </a:lvl8pPr>
+    <a:lvl9pPr marL="3657600" algn="l" defTabSz="914400" rtl="0" eaLnBrk="1" latinLnBrk="0" hangingPunct="1">
+      <a:defRPr sz="1200" kern="1200">
+        <a:solidFill>
+          <a:schemeClr val="tx1"/>
+        </a:solidFill>
+        <a:latin typeface="+mn-lt"/>
+        <a:ea typeface="+mn-ea"/>
+        <a:cs typeface="+mn-cs"/>
+      </a:defRPr>
+    </a:lvl9pPr>
+  </p:notesStyle>
+</p:notesMaster>
+</file>
+
+<file path=ppt/notesSlides/notesSlide1.xml><?xml version="1.0" encoding="utf-8"?>
+<p:notes xmlns:a="http://schemas.openxmlformats.org/drawingml/2006/main" xmlns:r="http://schemas.openxmlformats.org/officeDocument/2006/relationships" xmlns:p="http://schemas.openxmlformats.org/presentationml/2006/main">
+  <p:cSld>
+    <p:spTree>
+      <p:nvGrpSpPr>
+        <p:cNvPr id="1" name=""/>
+        <p:cNvGrpSpPr/>
+        <p:nvPr/>
+      </p:nvGrpSpPr>
+      <p:grpSpPr>
+        <a:xfrm>
+          <a:off x="0" y="0"/>
+          <a:ext cx="0" cy="0"/>
+          <a:chOff x="0" y="0"/>
+          <a:chExt cx="0" cy="0"/>
+        </a:xfrm>
+      </p:grpSpPr>
+      <p:sp>
+        <p:nvSpPr>
+          <p:cNvPr id="2" name="Slide Image Placeholder 1"/>
+          <p:cNvSpPr>
+            <a:spLocks noGrp="1" noRot="1" noChangeAspect="1"/>
+          </p:cNvSpPr>
+          <p:nvPr>
+            <p:ph type="sldImg"/>
+          </p:nvPr>
+        </p:nvSpPr>
+        <p:spPr/>
+      </p:sp>
+      <p:sp>
+        <p:nvSpPr>
+          <p:cNvPr id="3" name="Notes Placeholder 2"/>
+          <p:cNvSpPr>
+            <a:spLocks noGrp="1"/>
+          </p:cNvSpPr>
+          <p:nvPr>
+            <p:ph type="body" idx="1"/>
+          </p:nvPr>
+        </p:nvSpPr>
+        <p:spPr/>
+        <p:txBody>
+          <a:bodyPr>
+            <a:normAutofit/>
+          </a:bodyPr>
+          <a:lstStyle/>
+          <a:p>
+            <a:endParaRPr lang="en-US"/>
+          </a:p>
+        </p:txBody>
+      </p:sp>
+      <p:sp>
+        <p:nvSpPr>
+          <p:cNvPr id="4" name="Slide Number Placeholder 3"/>
+          <p:cNvSpPr>
+            <a:spLocks noGrp="1"/>
+          </p:cNvSpPr>
+          <p:nvPr>
+            <p:ph type="sldNum" sz="quarter" idx="10"/>
+          </p:nvPr>
+        </p:nvSpPr>
+        <p:spPr/>
+        <p:txBody>
+          <a:bodyPr/>
+          <a:lstStyle/>
+          <a:p>
+            <a:fld id="{C83EBA45-849A-47A7-9B7D-A6A1B7B72BD9}" type="slidenum">
+              <a:rPr lang="en-US" smtClean="0"/>
+              <a:t>11</a:t>
+            </a:fld>
+            <a:endParaRPr lang="en-US"/>
+          </a:p>
+        </p:txBody>
+      </p:sp>
+    </p:spTree>
+  </p:cSld>
+  <p:clrMapOvr>
+    <a:masterClrMapping/>
+  </p:clrMapOvr>
+</p:notes>
+</file>
+
+<file path=ppt/notesSlides/notesSlide2.xml><?xml version="1.0" encoding="utf-8"?>
+<p:notes xmlns:a="http://schemas.openxmlformats.org/drawingml/2006/main" xmlns:r="http://schemas.openxmlformats.org/officeDocument/2006/relationships" xmlns:p="http://schemas.openxmlformats.org/presentationml/2006/main">
+  <p:cSld>
+    <p:spTree>
+      <p:nvGrpSpPr>
+        <p:cNvPr id="1" name=""/>
+        <p:cNvGrpSpPr/>
+        <p:nvPr/>
+      </p:nvGrpSpPr>
+      <p:grpSpPr>
+        <a:xfrm>
+          <a:off x="0" y="0"/>
+          <a:ext cx="0" cy="0"/>
+          <a:chOff x="0" y="0"/>
+          <a:chExt cx="0" cy="0"/>
+        </a:xfrm>
+      </p:grpSpPr>
+      <p:sp>
+        <p:nvSpPr>
+          <p:cNvPr id="2" name="Slide Image Placeholder 1"/>
+          <p:cNvSpPr>
+            <a:spLocks noGrp="1" noRot="1" noChangeAspect="1"/>
+          </p:cNvSpPr>
+          <p:nvPr>
+            <p:ph type="sldImg"/>
+          </p:nvPr>
+        </p:nvSpPr>
+        <p:spPr/>
+      </p:sp>
+      <p:sp>
+        <p:nvSpPr>
+          <p:cNvPr id="3" name="Notes Placeholder 2"/>
+          <p:cNvSpPr>
+            <a:spLocks noGrp="1"/>
+          </p:cNvSpPr>
+          <p:nvPr>
+            <p:ph type="body" idx="1"/>
+          </p:nvPr>
+        </p:nvSpPr>
+        <p:spPr/>
+        <p:txBody>
+          <a:bodyPr>
+            <a:normAutofit/>
+          </a:bodyPr>
+          <a:lstStyle/>
+          <a:p>
+            <a:endParaRPr lang="en-US" dirty="0"/>
+          </a:p>
+        </p:txBody>
+      </p:sp>
+      <p:sp>
+        <p:nvSpPr>
+          <p:cNvPr id="4" name="Slide Number Placeholder 3"/>
+          <p:cNvSpPr>
+            <a:spLocks noGrp="1"/>
+          </p:cNvSpPr>
+          <p:nvPr>
+            <p:ph type="sldNum" sz="quarter" idx="10"/>
+          </p:nvPr>
+        </p:nvSpPr>
+        <p:spPr/>
+        <p:txBody>
+          <a:bodyPr/>
+          <a:lstStyle/>
+          <a:p>
+            <a:fld id="{C83EBA45-849A-47A7-9B7D-A6A1B7B72BD9}" type="slidenum">
+              <a:rPr lang="en-US" smtClean="0"/>
+              <a:t>12</a:t>
+            </a:fld>
+            <a:endParaRPr lang="en-US"/>
+          </a:p>
+        </p:txBody>
+      </p:sp>
+    </p:spTree>
+  </p:cSld>
+  <p:clrMapOvr>
+    <a:masterClrMapping/>
+  </p:clrMapOvr>
+</p:notes>
+</file>
+
 <file path=ppt/slideLayouts/slideLayout1.xml><?xml version="1.0" encoding="utf-8"?>
 <p:sldLayout xmlns:a="http://schemas.openxmlformats.org/drawingml/2006/main" xmlns:r="http://schemas.openxmlformats.org/officeDocument/2006/relationships" xmlns:p="http://schemas.openxmlformats.org/presentationml/2006/main" type="title" preserve="1">
   <p:cSld name="Title Slide">
@@ -300,7 +815,7 @@
             <a:fld id="{5B9887AD-EDD1-495D-9082-4E8CCED0CC24}" type="datetimeFigureOut">
               <a:rPr lang="en-US" smtClean="0"/>
               <a:pPr/>
-              <a:t>6/17/2014</a:t>
+              <a:t>6/18/2014</a:t>
             </a:fld>
             <a:endParaRPr lang="en-US"/>
           </a:p>
@@ -467,7 +982,7 @@
             <a:fld id="{5B9887AD-EDD1-495D-9082-4E8CCED0CC24}" type="datetimeFigureOut">
               <a:rPr lang="en-US" smtClean="0"/>
               <a:pPr/>
-              <a:t>6/17/2014</a:t>
+              <a:t>6/18/2014</a:t>
             </a:fld>
             <a:endParaRPr lang="en-US"/>
           </a:p>
@@ -644,7 +1159,7 @@
             <a:fld id="{5B9887AD-EDD1-495D-9082-4E8CCED0CC24}" type="datetimeFigureOut">
               <a:rPr lang="en-US" smtClean="0"/>
               <a:pPr/>
-              <a:t>6/17/2014</a:t>
+              <a:t>6/18/2014</a:t>
             </a:fld>
             <a:endParaRPr lang="en-US"/>
           </a:p>
@@ -811,7 +1326,7 @@
             <a:fld id="{5B9887AD-EDD1-495D-9082-4E8CCED0CC24}" type="datetimeFigureOut">
               <a:rPr lang="en-US" smtClean="0"/>
               <a:pPr/>
-              <a:t>6/17/2014</a:t>
+              <a:t>6/18/2014</a:t>
             </a:fld>
             <a:endParaRPr lang="en-US"/>
           </a:p>
@@ -1054,7 +1569,7 @@
             <a:fld id="{5B9887AD-EDD1-495D-9082-4E8CCED0CC24}" type="datetimeFigureOut">
               <a:rPr lang="en-US" smtClean="0"/>
               <a:pPr/>
-              <a:t>6/17/2014</a:t>
+              <a:t>6/18/2014</a:t>
             </a:fld>
             <a:endParaRPr lang="en-US"/>
           </a:p>
@@ -1339,7 +1854,7 @@
             <a:fld id="{5B9887AD-EDD1-495D-9082-4E8CCED0CC24}" type="datetimeFigureOut">
               <a:rPr lang="en-US" smtClean="0"/>
               <a:pPr/>
-              <a:t>6/17/2014</a:t>
+              <a:t>6/18/2014</a:t>
             </a:fld>
             <a:endParaRPr lang="en-US"/>
           </a:p>
@@ -1758,7 +2273,7 @@
             <a:fld id="{5B9887AD-EDD1-495D-9082-4E8CCED0CC24}" type="datetimeFigureOut">
               <a:rPr lang="en-US" smtClean="0"/>
               <a:pPr/>
-              <a:t>6/17/2014</a:t>
+              <a:t>6/18/2014</a:t>
             </a:fld>
             <a:endParaRPr lang="en-US"/>
           </a:p>
@@ -1873,7 +2388,7 @@
             <a:fld id="{5B9887AD-EDD1-495D-9082-4E8CCED0CC24}" type="datetimeFigureOut">
               <a:rPr lang="en-US" smtClean="0"/>
               <a:pPr/>
-              <a:t>6/17/2014</a:t>
+              <a:t>6/18/2014</a:t>
             </a:fld>
             <a:endParaRPr lang="en-US"/>
           </a:p>
@@ -1965,7 +2480,7 @@
             <a:fld id="{5B9887AD-EDD1-495D-9082-4E8CCED0CC24}" type="datetimeFigureOut">
               <a:rPr lang="en-US" smtClean="0"/>
               <a:pPr/>
-              <a:t>6/17/2014</a:t>
+              <a:t>6/18/2014</a:t>
             </a:fld>
             <a:endParaRPr lang="en-US"/>
           </a:p>
@@ -2239,7 +2754,7 @@
             <a:fld id="{5B9887AD-EDD1-495D-9082-4E8CCED0CC24}" type="datetimeFigureOut">
               <a:rPr lang="en-US" smtClean="0"/>
               <a:pPr/>
-              <a:t>6/17/2014</a:t>
+              <a:t>6/18/2014</a:t>
             </a:fld>
             <a:endParaRPr lang="en-US"/>
           </a:p>
@@ -2489,7 +3004,7 @@
             <a:fld id="{5B9887AD-EDD1-495D-9082-4E8CCED0CC24}" type="datetimeFigureOut">
               <a:rPr lang="en-US" smtClean="0"/>
               <a:pPr/>
-              <a:t>6/17/2014</a:t>
+              <a:t>6/18/2014</a:t>
             </a:fld>
             <a:endParaRPr lang="en-US"/>
           </a:p>
@@ -2699,7 +3214,7 @@
             <a:fld id="{5B9887AD-EDD1-495D-9082-4E8CCED0CC24}" type="datetimeFigureOut">
               <a:rPr lang="en-US" smtClean="0"/>
               <a:pPr/>
-              <a:t>6/17/2014</a:t>
+              <a:t>6/18/2014</a:t>
             </a:fld>
             <a:endParaRPr lang="en-US"/>
           </a:p>
@@ -3089,19 +3604,7 @@
           <a:p>
             <a:r>
               <a:rPr lang="en-US" dirty="0" smtClean="0"/>
-              <a:t>Los </a:t>
-            </a:r>
-            <a:r>
-              <a:rPr lang="en-US" dirty="0" smtClean="0"/>
-              <a:t>Alamos </a:t>
-            </a:r>
-            <a:r>
-              <a:rPr lang="en-US" dirty="0" smtClean="0"/>
-              <a:t>Coding Dojo Meeting </a:t>
-            </a:r>
-            <a:r>
-              <a:rPr lang="en-US" dirty="0" smtClean="0"/>
-              <a:t>#3</a:t>
+              <a:t>Los Alamos Coding Dojo Meeting #3</a:t>
             </a:r>
             <a:br>
               <a:rPr lang="en-US" dirty="0" smtClean="0"/>
@@ -3183,7 +3686,7 @@
           <a:p>
             <a:r>
               <a:rPr lang="en-US" dirty="0" smtClean="0"/>
-              <a:t>Test Cases</a:t>
+              <a:t>Software API Adaptor</a:t>
             </a:r>
             <a:endParaRPr lang="en-US" dirty="0"/>
           </a:p>
@@ -3196,14 +3699,227 @@
             <a:spLocks noGrp="1"/>
           </p:cNvSpPr>
           <p:nvPr>
-            <p:ph idx="1"/>
-          </p:nvPr>
-        </p:nvSpPr>
-        <p:spPr/>
-        <p:txBody>
-          <a:bodyPr/>
-          <a:lstStyle/>
-          <a:p>
+            <p:ph sz="half" idx="1"/>
+          </p:nvPr>
+        </p:nvSpPr>
+        <p:spPr>
+          <a:xfrm>
+            <a:off x="609600" y="1371600"/>
+            <a:ext cx="2209800" cy="2209800"/>
+          </a:xfrm>
+          <a:ln w="25400">
+            <a:solidFill>
+              <a:schemeClr val="tx1"/>
+            </a:solidFill>
+          </a:ln>
+        </p:spPr>
+        <p:txBody>
+          <a:bodyPr>
+            <a:normAutofit fontScale="70000" lnSpcReduction="20000"/>
+          </a:bodyPr>
+          <a:lstStyle/>
+          <a:p>
+            <a:pPr>
+              <a:buNone/>
+            </a:pPr>
+            <a:r>
+              <a:rPr lang="en-US" b="1" dirty="0" smtClean="0"/>
+              <a:t>minesweeper.py</a:t>
+            </a:r>
+          </a:p>
+          <a:p>
+            <a:pPr>
+              <a:buNone/>
+            </a:pPr>
+            <a:endParaRPr lang="en-US" b="1" dirty="0" smtClean="0"/>
+          </a:p>
+          <a:p>
+            <a:pPr>
+              <a:buNone/>
+            </a:pPr>
+            <a:r>
+              <a:rPr lang="en-US" dirty="0" smtClean="0"/>
+              <a:t>Input: file on disk</a:t>
+            </a:r>
+          </a:p>
+          <a:p>
+            <a:pPr>
+              <a:buNone/>
+            </a:pPr>
+            <a:r>
+              <a:rPr lang="en-US" dirty="0" smtClean="0"/>
+              <a:t>Output: </a:t>
+            </a:r>
+            <a:r>
+              <a:rPr lang="en-US" dirty="0" err="1" smtClean="0"/>
+              <a:t>stdout</a:t>
+            </a:r>
+            <a:endParaRPr lang="en-US" dirty="0"/>
+          </a:p>
+        </p:txBody>
+      </p:sp>
+      <p:sp>
+        <p:nvSpPr>
+          <p:cNvPr id="4" name="Content Placeholder 3"/>
+          <p:cNvSpPr>
+            <a:spLocks noGrp="1"/>
+          </p:cNvSpPr>
+          <p:nvPr>
+            <p:ph sz="half" idx="2"/>
+          </p:nvPr>
+        </p:nvSpPr>
+        <p:spPr>
+          <a:xfrm>
+            <a:off x="5105400" y="1371600"/>
+            <a:ext cx="3505200" cy="3733800"/>
+          </a:xfrm>
+          <a:ln w="25400">
+            <a:solidFill>
+              <a:schemeClr val="tx1"/>
+            </a:solidFill>
+          </a:ln>
+        </p:spPr>
+        <p:txBody>
+          <a:bodyPr>
+            <a:normAutofit fontScale="70000" lnSpcReduction="20000"/>
+          </a:bodyPr>
+          <a:lstStyle/>
+          <a:p>
+            <a:pPr>
+              <a:buNone/>
+            </a:pPr>
+            <a:r>
+              <a:rPr lang="en-US" b="1" dirty="0" smtClean="0"/>
+              <a:t>Ideal Test Setup</a:t>
+            </a:r>
+          </a:p>
+          <a:p>
+            <a:pPr>
+              <a:buNone/>
+            </a:pPr>
+            <a:endParaRPr lang="en-US" b="1" dirty="0" smtClean="0"/>
+          </a:p>
+          <a:p>
+            <a:pPr>
+              <a:buNone/>
+            </a:pPr>
+            <a:r>
+              <a:rPr lang="en-US" dirty="0" err="1" smtClean="0"/>
+              <a:t>test_minesweeper</a:t>
+            </a:r>
+            <a:r>
+              <a:rPr lang="en-US" dirty="0" smtClean="0"/>
+              <a:t>()</a:t>
+            </a:r>
+          </a:p>
+          <a:p>
+            <a:pPr>
+              <a:buNone/>
+            </a:pPr>
+            <a:r>
+              <a:rPr lang="en-US" dirty="0" smtClean="0"/>
+              <a:t>{</a:t>
+            </a:r>
+          </a:p>
+          <a:p>
+            <a:pPr>
+              <a:buNone/>
+            </a:pPr>
+            <a:r>
+              <a:rPr lang="en-US" dirty="0" smtClean="0"/>
+              <a:t>  input = “1 1\n</a:t>
+            </a:r>
+          </a:p>
+          <a:p>
+            <a:pPr>
+              <a:buNone/>
+            </a:pPr>
+            <a:r>
+              <a:rPr lang="en-US" dirty="0" smtClean="0"/>
+              <a:t> </a:t>
+            </a:r>
+            <a:r>
+              <a:rPr lang="en-US" dirty="0" smtClean="0"/>
+              <a:t>                 .\n</a:t>
+            </a:r>
+          </a:p>
+          <a:p>
+            <a:pPr>
+              <a:buNone/>
+            </a:pPr>
+            <a:r>
+              <a:rPr lang="en-US" dirty="0" smtClean="0"/>
+              <a:t> </a:t>
+            </a:r>
+            <a:r>
+              <a:rPr lang="en-US" dirty="0" smtClean="0"/>
+              <a:t>                 0 0”</a:t>
+            </a:r>
+          </a:p>
+          <a:p>
+            <a:pPr>
+              <a:buNone/>
+            </a:pPr>
+            <a:r>
+              <a:rPr lang="en-US" dirty="0" smtClean="0"/>
+              <a:t>  </a:t>
+            </a:r>
+            <a:r>
+              <a:rPr lang="en-US" dirty="0" err="1" smtClean="0"/>
+              <a:t>expected_output</a:t>
+            </a:r>
+            <a:r>
+              <a:rPr lang="en-US" dirty="0" smtClean="0"/>
+              <a:t> = “*”</a:t>
+            </a:r>
+          </a:p>
+          <a:p>
+            <a:pPr>
+              <a:buNone/>
+            </a:pPr>
+            <a:r>
+              <a:rPr lang="en-US" dirty="0" smtClean="0"/>
+              <a:t>  output =     </a:t>
+            </a:r>
+          </a:p>
+          <a:p>
+            <a:pPr>
+              <a:buNone/>
+            </a:pPr>
+            <a:r>
+              <a:rPr lang="en-US" dirty="0" smtClean="0"/>
+              <a:t> </a:t>
+            </a:r>
+            <a:r>
+              <a:rPr lang="en-US" dirty="0" smtClean="0"/>
+              <a:t>             minesweeper(input)</a:t>
+            </a:r>
+          </a:p>
+          <a:p>
+            <a:pPr>
+              <a:buNone/>
+            </a:pPr>
+            <a:r>
+              <a:rPr lang="en-US" dirty="0" smtClean="0"/>
+              <a:t>  output == </a:t>
+            </a:r>
+            <a:r>
+              <a:rPr lang="en-US" dirty="0" err="1" smtClean="0"/>
+              <a:t>expected_output</a:t>
+            </a:r>
+            <a:r>
+              <a:rPr lang="en-US" dirty="0" smtClean="0"/>
+              <a:t> </a:t>
+            </a:r>
+          </a:p>
+          <a:p>
+            <a:pPr>
+              <a:buNone/>
+            </a:pPr>
+            <a:r>
+              <a:rPr lang="en-US" dirty="0" smtClean="0"/>
+              <a:t>}</a:t>
+            </a:r>
             <a:endParaRPr lang="en-US" dirty="0"/>
           </a:p>
         </p:txBody>
@@ -3250,7 +3966,11 @@
           <a:p>
             <a:r>
               <a:rPr lang="en-US" dirty="0" smtClean="0"/>
-              <a:t>Implement Tests</a:t>
+              <a:t>Software API </a:t>
+            </a:r>
+            <a:r>
+              <a:rPr lang="en-US" dirty="0" smtClean="0"/>
+              <a:t>Adaptor (2)</a:t>
             </a:r>
             <a:endParaRPr lang="en-US" dirty="0"/>
           </a:p>
@@ -3263,35 +3983,348 @@
             <a:spLocks noGrp="1"/>
           </p:cNvSpPr>
           <p:nvPr>
-            <p:ph idx="1"/>
-          </p:nvPr>
-        </p:nvSpPr>
-        <p:spPr/>
-        <p:txBody>
-          <a:bodyPr/>
-          <a:lstStyle/>
-          <a:p>
-            <a:r>
-              <a:rPr lang="en-US" dirty="0" smtClean="0"/>
-              <a:t>Write your own software </a:t>
+            <p:ph sz="half" idx="1"/>
+          </p:nvPr>
+        </p:nvSpPr>
+        <p:spPr>
+          <a:xfrm>
+            <a:off x="76200" y="1371600"/>
+            <a:ext cx="2209800" cy="2209800"/>
+          </a:xfrm>
+          <a:ln w="25400">
+            <a:solidFill>
+              <a:schemeClr val="tx1"/>
+            </a:solidFill>
+          </a:ln>
+        </p:spPr>
+        <p:txBody>
+          <a:bodyPr>
+            <a:normAutofit fontScale="70000" lnSpcReduction="20000"/>
+          </a:bodyPr>
+          <a:lstStyle/>
+          <a:p>
+            <a:pPr>
+              <a:buNone/>
+            </a:pPr>
+            <a:r>
+              <a:rPr lang="en-US" b="1" dirty="0" smtClean="0"/>
+              <a:t>minesweeper.py</a:t>
+            </a:r>
+          </a:p>
+          <a:p>
+            <a:pPr>
+              <a:buNone/>
+            </a:pPr>
+            <a:endParaRPr lang="en-US" b="1" dirty="0" smtClean="0"/>
+          </a:p>
+          <a:p>
+            <a:pPr>
+              <a:buNone/>
+            </a:pPr>
+            <a:r>
+              <a:rPr lang="en-US" dirty="0" smtClean="0"/>
+              <a:t>Input: file on disk</a:t>
+            </a:r>
+          </a:p>
+          <a:p>
+            <a:pPr>
+              <a:buNone/>
+            </a:pPr>
+            <a:r>
+              <a:rPr lang="en-US" dirty="0" smtClean="0"/>
+              <a:t>Output: </a:t>
             </a:r>
             <a:r>
               <a:rPr lang="en-US" dirty="0" err="1" smtClean="0"/>
-              <a:t>api</a:t>
-            </a:r>
-            <a:r>
-              <a:rPr lang="en-US" dirty="0" smtClean="0"/>
-              <a:t> adaptor</a:t>
-            </a:r>
-          </a:p>
-          <a:p>
-            <a:r>
-              <a:rPr lang="en-US" dirty="0" smtClean="0"/>
-              <a:t>Add tests to your code</a:t>
-            </a:r>
-          </a:p>
-          <a:p>
+              <a:t>stdout</a:t>
+            </a:r>
             <a:endParaRPr lang="en-US" dirty="0"/>
+          </a:p>
+        </p:txBody>
+      </p:sp>
+      <p:sp>
+        <p:nvSpPr>
+          <p:cNvPr id="4" name="Content Placeholder 3"/>
+          <p:cNvSpPr>
+            <a:spLocks noGrp="1"/>
+          </p:cNvSpPr>
+          <p:nvPr>
+            <p:ph sz="half" idx="2"/>
+          </p:nvPr>
+        </p:nvSpPr>
+        <p:spPr>
+          <a:xfrm>
+            <a:off x="5562600" y="1371600"/>
+            <a:ext cx="3505200" cy="3733800"/>
+          </a:xfrm>
+          <a:ln w="25400">
+            <a:solidFill>
+              <a:schemeClr val="tx1"/>
+            </a:solidFill>
+          </a:ln>
+        </p:spPr>
+        <p:txBody>
+          <a:bodyPr>
+            <a:normAutofit fontScale="70000" lnSpcReduction="20000"/>
+          </a:bodyPr>
+          <a:lstStyle/>
+          <a:p>
+            <a:pPr>
+              <a:buNone/>
+            </a:pPr>
+            <a:r>
+              <a:rPr lang="en-US" b="1" dirty="0" smtClean="0"/>
+              <a:t>Ideal Test Setup</a:t>
+            </a:r>
+          </a:p>
+          <a:p>
+            <a:pPr>
+              <a:buNone/>
+            </a:pPr>
+            <a:endParaRPr lang="en-US" b="1" dirty="0" smtClean="0"/>
+          </a:p>
+          <a:p>
+            <a:pPr>
+              <a:buNone/>
+            </a:pPr>
+            <a:r>
+              <a:rPr lang="en-US" dirty="0" err="1" smtClean="0"/>
+              <a:t>test_minesweeper</a:t>
+            </a:r>
+            <a:r>
+              <a:rPr lang="en-US" dirty="0" smtClean="0"/>
+              <a:t>()</a:t>
+            </a:r>
+          </a:p>
+          <a:p>
+            <a:pPr>
+              <a:buNone/>
+            </a:pPr>
+            <a:r>
+              <a:rPr lang="en-US" dirty="0" smtClean="0"/>
+              <a:t>{</a:t>
+            </a:r>
+          </a:p>
+          <a:p>
+            <a:pPr>
+              <a:buNone/>
+            </a:pPr>
+            <a:r>
+              <a:rPr lang="en-US" dirty="0" smtClean="0"/>
+              <a:t>  input = “1 1\n</a:t>
+            </a:r>
+          </a:p>
+          <a:p>
+            <a:pPr>
+              <a:buNone/>
+            </a:pPr>
+            <a:r>
+              <a:rPr lang="en-US" dirty="0" smtClean="0"/>
+              <a:t> </a:t>
+            </a:r>
+            <a:r>
+              <a:rPr lang="en-US" dirty="0" smtClean="0"/>
+              <a:t>                 .\n</a:t>
+            </a:r>
+          </a:p>
+          <a:p>
+            <a:pPr>
+              <a:buNone/>
+            </a:pPr>
+            <a:r>
+              <a:rPr lang="en-US" dirty="0" smtClean="0"/>
+              <a:t> </a:t>
+            </a:r>
+            <a:r>
+              <a:rPr lang="en-US" dirty="0" smtClean="0"/>
+              <a:t>                 0 0”</a:t>
+            </a:r>
+          </a:p>
+          <a:p>
+            <a:pPr>
+              <a:buNone/>
+            </a:pPr>
+            <a:r>
+              <a:rPr lang="en-US" dirty="0" smtClean="0"/>
+              <a:t>  </a:t>
+            </a:r>
+            <a:r>
+              <a:rPr lang="en-US" dirty="0" err="1" smtClean="0"/>
+              <a:t>expected_output</a:t>
+            </a:r>
+            <a:r>
+              <a:rPr lang="en-US" dirty="0" smtClean="0"/>
+              <a:t> = “*”</a:t>
+            </a:r>
+          </a:p>
+          <a:p>
+            <a:pPr>
+              <a:buNone/>
+            </a:pPr>
+            <a:r>
+              <a:rPr lang="en-US" dirty="0" smtClean="0"/>
+              <a:t>  output =     </a:t>
+            </a:r>
+          </a:p>
+          <a:p>
+            <a:pPr>
+              <a:buNone/>
+            </a:pPr>
+            <a:r>
+              <a:rPr lang="en-US" dirty="0" smtClean="0"/>
+              <a:t> </a:t>
+            </a:r>
+            <a:r>
+              <a:rPr lang="en-US" dirty="0" smtClean="0"/>
+              <a:t>             minesweeper(input)</a:t>
+            </a:r>
+          </a:p>
+          <a:p>
+            <a:pPr>
+              <a:buNone/>
+            </a:pPr>
+            <a:r>
+              <a:rPr lang="en-US" dirty="0" smtClean="0"/>
+              <a:t>  output == </a:t>
+            </a:r>
+            <a:r>
+              <a:rPr lang="en-US" dirty="0" err="1" smtClean="0"/>
+              <a:t>expected_output</a:t>
+            </a:r>
+            <a:r>
+              <a:rPr lang="en-US" dirty="0" smtClean="0"/>
+              <a:t> </a:t>
+            </a:r>
+          </a:p>
+          <a:p>
+            <a:pPr>
+              <a:buNone/>
+            </a:pPr>
+            <a:r>
+              <a:rPr lang="en-US" dirty="0" smtClean="0"/>
+              <a:t>}</a:t>
+            </a:r>
+            <a:endParaRPr lang="en-US" dirty="0"/>
+          </a:p>
+        </p:txBody>
+      </p:sp>
+      <p:sp>
+        <p:nvSpPr>
+          <p:cNvPr id="5" name="Content Placeholder 2"/>
+          <p:cNvSpPr txBox="1">
+            <a:spLocks/>
+          </p:cNvSpPr>
+          <p:nvPr/>
+        </p:nvSpPr>
+        <p:spPr>
+          <a:xfrm>
+            <a:off x="2362200" y="1371600"/>
+            <a:ext cx="3124200" cy="5334000"/>
+          </a:xfrm>
+          <a:prstGeom prst="rect">
+            <a:avLst/>
+          </a:prstGeom>
+          <a:ln w="25400">
+            <a:solidFill>
+              <a:schemeClr val="tx1"/>
+            </a:solidFill>
+          </a:ln>
+        </p:spPr>
+        <p:txBody>
+          <a:bodyPr vert="horz" lIns="91440" tIns="45720" rIns="91440" bIns="45720" rtlCol="0">
+            <a:normAutofit/>
+          </a:bodyPr>
+          <a:lstStyle/>
+          <a:p>
+            <a:pPr marL="342900" marR="0" lvl="0" indent="-342900" algn="l" defTabSz="914400" rtl="0" eaLnBrk="1" fontAlgn="auto" latinLnBrk="0" hangingPunct="1">
+              <a:lnSpc>
+                <a:spcPct val="100000"/>
+              </a:lnSpc>
+              <a:spcBef>
+                <a:spcPct val="20000"/>
+              </a:spcBef>
+              <a:spcAft>
+                <a:spcPts val="0"/>
+              </a:spcAft>
+              <a:buClrTx/>
+              <a:buSzTx/>
+              <a:buFont typeface="Arial" pitchFamily="34" charset="0"/>
+              <a:buNone/>
+              <a:tabLst/>
+              <a:defRPr/>
+            </a:pPr>
+            <a:r>
+              <a:rPr lang="en-US" sz="2800" b="1" dirty="0" smtClean="0"/>
+              <a:t>adaptor</a:t>
+            </a:r>
+            <a:r>
+              <a:rPr kumimoji="0" lang="en-US" sz="2800" b="1" i="0" u="none" strike="noStrike" kern="1200" cap="none" spc="0" normalizeH="0" baseline="0" noProof="0" dirty="0" smtClean="0">
+                <a:ln>
+                  <a:noFill/>
+                </a:ln>
+                <a:solidFill>
+                  <a:schemeClr val="tx1"/>
+                </a:solidFill>
+                <a:effectLst/>
+                <a:uLnTx/>
+                <a:uFillTx/>
+                <a:latin typeface="+mn-lt"/>
+                <a:ea typeface="+mn-ea"/>
+                <a:cs typeface="+mn-cs"/>
+              </a:rPr>
+              <a:t>.</a:t>
+            </a:r>
+            <a:r>
+              <a:rPr kumimoji="0" lang="en-US" sz="2800" b="1" i="0" u="none" strike="noStrike" kern="1200" cap="none" spc="0" normalizeH="0" baseline="0" noProof="0" dirty="0" err="1" smtClean="0">
+                <a:ln>
+                  <a:noFill/>
+                </a:ln>
+                <a:solidFill>
+                  <a:schemeClr val="tx1"/>
+                </a:solidFill>
+                <a:effectLst/>
+                <a:uLnTx/>
+                <a:uFillTx/>
+                <a:latin typeface="+mn-lt"/>
+                <a:ea typeface="+mn-ea"/>
+                <a:cs typeface="+mn-cs"/>
+              </a:rPr>
+              <a:t>py</a:t>
+            </a:r>
+            <a:endParaRPr lang="en-US" sz="2800" dirty="0" smtClean="0"/>
+          </a:p>
+          <a:p>
+            <a:pPr marL="342900" marR="0" lvl="0" indent="-342900" algn="l" defTabSz="914400" rtl="0" eaLnBrk="1" fontAlgn="auto" latinLnBrk="0" hangingPunct="1">
+              <a:lnSpc>
+                <a:spcPct val="100000"/>
+              </a:lnSpc>
+              <a:spcBef>
+                <a:spcPct val="20000"/>
+              </a:spcBef>
+              <a:spcAft>
+                <a:spcPts val="0"/>
+              </a:spcAft>
+              <a:buClrTx/>
+              <a:buSzTx/>
+              <a:buFont typeface="Arial" pitchFamily="34" charset="0"/>
+              <a:buNone/>
+              <a:tabLst/>
+              <a:defRPr/>
+            </a:pPr>
+            <a:endParaRPr kumimoji="0" lang="en-US" sz="2800" b="1" i="0" u="none" strike="noStrike" kern="1200" cap="none" spc="0" normalizeH="0" baseline="0" noProof="0" dirty="0" smtClean="0">
+              <a:ln>
+                <a:noFill/>
+              </a:ln>
+              <a:solidFill>
+                <a:schemeClr val="tx1"/>
+              </a:solidFill>
+              <a:effectLst/>
+              <a:uLnTx/>
+              <a:uFillTx/>
+              <a:latin typeface="+mn-lt"/>
+              <a:ea typeface="+mn-ea"/>
+              <a:cs typeface="+mn-cs"/>
+            </a:endParaRPr>
           </a:p>
         </p:txBody>
       </p:sp>
@@ -3300,10 +4333,807 @@
   <p:clrMapOvr>
     <a:masterClrMapping/>
   </p:clrMapOvr>
+  <p:timing>
+    <p:tnLst>
+      <p:par>
+        <p:cTn id="1" dur="indefinite" restart="never" nodeType="tmRoot"/>
+      </p:par>
+    </p:tnLst>
+  </p:timing>
 </p:sld>
 </file>
 
 <file path=ppt/slides/slide12.xml><?xml version="1.0" encoding="utf-8"?>
+<p:sld xmlns:a="http://schemas.openxmlformats.org/drawingml/2006/main" xmlns:r="http://schemas.openxmlformats.org/officeDocument/2006/relationships" xmlns:p="http://schemas.openxmlformats.org/presentationml/2006/main" show="0">
+  <p:cSld>
+    <p:spTree>
+      <p:nvGrpSpPr>
+        <p:cNvPr id="1" name=""/>
+        <p:cNvGrpSpPr/>
+        <p:nvPr/>
+      </p:nvGrpSpPr>
+      <p:grpSpPr>
+        <a:xfrm>
+          <a:off x="0" y="0"/>
+          <a:ext cx="0" cy="0"/>
+          <a:chOff x="0" y="0"/>
+          <a:chExt cx="0" cy="0"/>
+        </a:xfrm>
+      </p:grpSpPr>
+      <p:sp>
+        <p:nvSpPr>
+          <p:cNvPr id="2" name="Title 1"/>
+          <p:cNvSpPr>
+            <a:spLocks noGrp="1"/>
+          </p:cNvSpPr>
+          <p:nvPr>
+            <p:ph type="title"/>
+          </p:nvPr>
+        </p:nvSpPr>
+        <p:spPr/>
+        <p:txBody>
+          <a:bodyPr/>
+          <a:lstStyle/>
+          <a:p>
+            <a:r>
+              <a:rPr lang="en-US" dirty="0" smtClean="0"/>
+              <a:t>Software API </a:t>
+            </a:r>
+            <a:r>
+              <a:rPr lang="en-US" dirty="0" smtClean="0"/>
+              <a:t>Adaptor (2)</a:t>
+            </a:r>
+            <a:endParaRPr lang="en-US" dirty="0"/>
+          </a:p>
+        </p:txBody>
+      </p:sp>
+      <p:sp>
+        <p:nvSpPr>
+          <p:cNvPr id="3" name="Content Placeholder 2"/>
+          <p:cNvSpPr>
+            <a:spLocks noGrp="1"/>
+          </p:cNvSpPr>
+          <p:nvPr>
+            <p:ph sz="half" idx="1"/>
+          </p:nvPr>
+        </p:nvSpPr>
+        <p:spPr>
+          <a:xfrm>
+            <a:off x="76200" y="1371600"/>
+            <a:ext cx="2209800" cy="2209800"/>
+          </a:xfrm>
+          <a:ln w="25400">
+            <a:solidFill>
+              <a:schemeClr val="tx1"/>
+            </a:solidFill>
+          </a:ln>
+        </p:spPr>
+        <p:txBody>
+          <a:bodyPr>
+            <a:normAutofit fontScale="70000" lnSpcReduction="20000"/>
+          </a:bodyPr>
+          <a:lstStyle/>
+          <a:p>
+            <a:pPr>
+              <a:buNone/>
+            </a:pPr>
+            <a:r>
+              <a:rPr lang="en-US" b="1" dirty="0" smtClean="0"/>
+              <a:t>minesweeper.py</a:t>
+            </a:r>
+          </a:p>
+          <a:p>
+            <a:pPr>
+              <a:buNone/>
+            </a:pPr>
+            <a:endParaRPr lang="en-US" b="1" dirty="0" smtClean="0"/>
+          </a:p>
+          <a:p>
+            <a:pPr>
+              <a:buNone/>
+            </a:pPr>
+            <a:r>
+              <a:rPr lang="en-US" dirty="0" smtClean="0"/>
+              <a:t>Input: file on disk</a:t>
+            </a:r>
+          </a:p>
+          <a:p>
+            <a:pPr>
+              <a:buNone/>
+            </a:pPr>
+            <a:r>
+              <a:rPr lang="en-US" dirty="0" smtClean="0"/>
+              <a:t>Output: </a:t>
+            </a:r>
+            <a:r>
+              <a:rPr lang="en-US" dirty="0" err="1" smtClean="0"/>
+              <a:t>stdout</a:t>
+            </a:r>
+            <a:endParaRPr lang="en-US" dirty="0"/>
+          </a:p>
+        </p:txBody>
+      </p:sp>
+      <p:sp>
+        <p:nvSpPr>
+          <p:cNvPr id="4" name="Content Placeholder 3"/>
+          <p:cNvSpPr>
+            <a:spLocks noGrp="1"/>
+          </p:cNvSpPr>
+          <p:nvPr>
+            <p:ph sz="half" idx="2"/>
+          </p:nvPr>
+        </p:nvSpPr>
+        <p:spPr>
+          <a:xfrm>
+            <a:off x="5562600" y="1371600"/>
+            <a:ext cx="3505200" cy="3733800"/>
+          </a:xfrm>
+          <a:ln w="25400">
+            <a:solidFill>
+              <a:schemeClr val="tx1"/>
+            </a:solidFill>
+          </a:ln>
+        </p:spPr>
+        <p:txBody>
+          <a:bodyPr>
+            <a:normAutofit fontScale="70000" lnSpcReduction="20000"/>
+          </a:bodyPr>
+          <a:lstStyle/>
+          <a:p>
+            <a:pPr>
+              <a:buNone/>
+            </a:pPr>
+            <a:r>
+              <a:rPr lang="en-US" b="1" dirty="0" smtClean="0"/>
+              <a:t>Ideal Test Setup</a:t>
+            </a:r>
+          </a:p>
+          <a:p>
+            <a:pPr>
+              <a:buNone/>
+            </a:pPr>
+            <a:endParaRPr lang="en-US" b="1" dirty="0" smtClean="0"/>
+          </a:p>
+          <a:p>
+            <a:pPr>
+              <a:buNone/>
+            </a:pPr>
+            <a:r>
+              <a:rPr lang="en-US" dirty="0" err="1" smtClean="0"/>
+              <a:t>test_minesweeper</a:t>
+            </a:r>
+            <a:r>
+              <a:rPr lang="en-US" dirty="0" smtClean="0"/>
+              <a:t>()</a:t>
+            </a:r>
+          </a:p>
+          <a:p>
+            <a:pPr>
+              <a:buNone/>
+            </a:pPr>
+            <a:r>
+              <a:rPr lang="en-US" dirty="0" smtClean="0"/>
+              <a:t>{</a:t>
+            </a:r>
+          </a:p>
+          <a:p>
+            <a:pPr>
+              <a:buNone/>
+            </a:pPr>
+            <a:r>
+              <a:rPr lang="en-US" dirty="0" smtClean="0"/>
+              <a:t>  input = “1 1\n</a:t>
+            </a:r>
+          </a:p>
+          <a:p>
+            <a:pPr>
+              <a:buNone/>
+            </a:pPr>
+            <a:r>
+              <a:rPr lang="en-US" dirty="0" smtClean="0"/>
+              <a:t> </a:t>
+            </a:r>
+            <a:r>
+              <a:rPr lang="en-US" dirty="0" smtClean="0"/>
+              <a:t>                 .\n</a:t>
+            </a:r>
+          </a:p>
+          <a:p>
+            <a:pPr>
+              <a:buNone/>
+            </a:pPr>
+            <a:r>
+              <a:rPr lang="en-US" dirty="0" smtClean="0"/>
+              <a:t> </a:t>
+            </a:r>
+            <a:r>
+              <a:rPr lang="en-US" dirty="0" smtClean="0"/>
+              <a:t>                 0 0”</a:t>
+            </a:r>
+          </a:p>
+          <a:p>
+            <a:pPr>
+              <a:buNone/>
+            </a:pPr>
+            <a:r>
+              <a:rPr lang="en-US" dirty="0" smtClean="0"/>
+              <a:t>  </a:t>
+            </a:r>
+            <a:r>
+              <a:rPr lang="en-US" dirty="0" err="1" smtClean="0"/>
+              <a:t>expected_output</a:t>
+            </a:r>
+            <a:r>
+              <a:rPr lang="en-US" dirty="0" smtClean="0"/>
+              <a:t> = “*”</a:t>
+            </a:r>
+          </a:p>
+          <a:p>
+            <a:pPr>
+              <a:buNone/>
+            </a:pPr>
+            <a:r>
+              <a:rPr lang="en-US" dirty="0" smtClean="0"/>
+              <a:t>  output =     </a:t>
+            </a:r>
+          </a:p>
+          <a:p>
+            <a:pPr>
+              <a:buNone/>
+            </a:pPr>
+            <a:r>
+              <a:rPr lang="en-US" dirty="0" smtClean="0"/>
+              <a:t> </a:t>
+            </a:r>
+            <a:r>
+              <a:rPr lang="en-US" dirty="0" smtClean="0"/>
+              <a:t>             </a:t>
+            </a:r>
+            <a:r>
+              <a:rPr lang="en-US" dirty="0" err="1" smtClean="0"/>
+              <a:t>runMine</a:t>
+            </a:r>
+            <a:r>
+              <a:rPr lang="en-US" dirty="0" smtClean="0"/>
+              <a:t>(input)</a:t>
+            </a:r>
+          </a:p>
+          <a:p>
+            <a:pPr>
+              <a:buNone/>
+            </a:pPr>
+            <a:r>
+              <a:rPr lang="en-US" dirty="0" smtClean="0"/>
+              <a:t>  output == </a:t>
+            </a:r>
+            <a:r>
+              <a:rPr lang="en-US" dirty="0" err="1" smtClean="0"/>
+              <a:t>expected_output</a:t>
+            </a:r>
+            <a:r>
+              <a:rPr lang="en-US" dirty="0" smtClean="0"/>
+              <a:t> </a:t>
+            </a:r>
+          </a:p>
+          <a:p>
+            <a:pPr>
+              <a:buNone/>
+            </a:pPr>
+            <a:r>
+              <a:rPr lang="en-US" dirty="0" smtClean="0"/>
+              <a:t>}</a:t>
+            </a:r>
+            <a:endParaRPr lang="en-US" dirty="0"/>
+          </a:p>
+        </p:txBody>
+      </p:sp>
+      <p:sp>
+        <p:nvSpPr>
+          <p:cNvPr id="5" name="Content Placeholder 2"/>
+          <p:cNvSpPr txBox="1">
+            <a:spLocks/>
+          </p:cNvSpPr>
+          <p:nvPr/>
+        </p:nvSpPr>
+        <p:spPr>
+          <a:xfrm>
+            <a:off x="2362200" y="1371600"/>
+            <a:ext cx="3124200" cy="5334000"/>
+          </a:xfrm>
+          <a:prstGeom prst="rect">
+            <a:avLst/>
+          </a:prstGeom>
+          <a:ln w="25400">
+            <a:solidFill>
+              <a:schemeClr val="tx1"/>
+            </a:solidFill>
+          </a:ln>
+        </p:spPr>
+        <p:txBody>
+          <a:bodyPr vert="horz" lIns="91440" tIns="45720" rIns="91440" bIns="45720" rtlCol="0">
+            <a:normAutofit fontScale="92500" lnSpcReduction="20000"/>
+          </a:bodyPr>
+          <a:lstStyle/>
+          <a:p>
+            <a:pPr marL="342900" marR="0" lvl="0" indent="-342900" algn="l" defTabSz="914400" rtl="0" eaLnBrk="1" fontAlgn="auto" latinLnBrk="0" hangingPunct="1">
+              <a:lnSpc>
+                <a:spcPct val="100000"/>
+              </a:lnSpc>
+              <a:spcBef>
+                <a:spcPct val="20000"/>
+              </a:spcBef>
+              <a:spcAft>
+                <a:spcPts val="0"/>
+              </a:spcAft>
+              <a:buClrTx/>
+              <a:buSzTx/>
+              <a:buFont typeface="Arial" pitchFamily="34" charset="0"/>
+              <a:buNone/>
+              <a:tabLst/>
+              <a:defRPr/>
+            </a:pPr>
+            <a:r>
+              <a:rPr lang="en-US" sz="2800" b="1" dirty="0" smtClean="0"/>
+              <a:t>adaptor</a:t>
+            </a:r>
+            <a:r>
+              <a:rPr kumimoji="0" lang="en-US" sz="2800" b="1" i="0" u="none" strike="noStrike" kern="1200" cap="none" spc="0" normalizeH="0" baseline="0" noProof="0" dirty="0" smtClean="0">
+                <a:ln>
+                  <a:noFill/>
+                </a:ln>
+                <a:solidFill>
+                  <a:schemeClr val="tx1"/>
+                </a:solidFill>
+                <a:effectLst/>
+                <a:uLnTx/>
+                <a:uFillTx/>
+                <a:latin typeface="+mn-lt"/>
+                <a:ea typeface="+mn-ea"/>
+                <a:cs typeface="+mn-cs"/>
+              </a:rPr>
+              <a:t>.</a:t>
+            </a:r>
+            <a:r>
+              <a:rPr kumimoji="0" lang="en-US" sz="2800" b="1" i="0" u="none" strike="noStrike" kern="1200" cap="none" spc="0" normalizeH="0" baseline="0" noProof="0" dirty="0" err="1" smtClean="0">
+                <a:ln>
+                  <a:noFill/>
+                </a:ln>
+                <a:solidFill>
+                  <a:schemeClr val="tx1"/>
+                </a:solidFill>
+                <a:effectLst/>
+                <a:uLnTx/>
+                <a:uFillTx/>
+                <a:latin typeface="+mn-lt"/>
+                <a:ea typeface="+mn-ea"/>
+                <a:cs typeface="+mn-cs"/>
+              </a:rPr>
+              <a:t>py</a:t>
+            </a:r>
+            <a:endParaRPr lang="en-US" sz="2800" dirty="0" smtClean="0"/>
+          </a:p>
+          <a:p>
+            <a:pPr marL="342900" marR="0" lvl="0" indent="-342900" algn="l" defTabSz="914400" rtl="0" eaLnBrk="1" fontAlgn="auto" latinLnBrk="0" hangingPunct="1">
+              <a:lnSpc>
+                <a:spcPct val="100000"/>
+              </a:lnSpc>
+              <a:spcBef>
+                <a:spcPct val="20000"/>
+              </a:spcBef>
+              <a:spcAft>
+                <a:spcPts val="0"/>
+              </a:spcAft>
+              <a:buClrTx/>
+              <a:buSzTx/>
+              <a:buFont typeface="Arial" pitchFamily="34" charset="0"/>
+              <a:buNone/>
+              <a:tabLst/>
+              <a:defRPr/>
+            </a:pPr>
+            <a:endParaRPr kumimoji="0" lang="en-US" sz="2800" b="1" i="0" u="none" strike="noStrike" kern="1200" cap="none" spc="0" normalizeH="0" baseline="0" noProof="0" dirty="0" smtClean="0">
+              <a:ln>
+                <a:noFill/>
+              </a:ln>
+              <a:solidFill>
+                <a:schemeClr val="tx1"/>
+              </a:solidFill>
+              <a:effectLst/>
+              <a:uLnTx/>
+              <a:uFillTx/>
+              <a:latin typeface="+mn-lt"/>
+              <a:ea typeface="+mn-ea"/>
+              <a:cs typeface="+mn-cs"/>
+            </a:endParaRPr>
+          </a:p>
+          <a:p>
+            <a:pPr marL="342900" marR="0" lvl="0" indent="-342900" algn="l" defTabSz="914400" rtl="0" eaLnBrk="1" fontAlgn="auto" latinLnBrk="0" hangingPunct="1">
+              <a:lnSpc>
+                <a:spcPct val="100000"/>
+              </a:lnSpc>
+              <a:spcBef>
+                <a:spcPct val="20000"/>
+              </a:spcBef>
+              <a:spcAft>
+                <a:spcPts val="0"/>
+              </a:spcAft>
+              <a:buClrTx/>
+              <a:buSzTx/>
+              <a:buFont typeface="Arial" pitchFamily="34" charset="0"/>
+              <a:buNone/>
+              <a:tabLst/>
+              <a:defRPr/>
+            </a:pPr>
+            <a:r>
+              <a:rPr lang="en-US" sz="2800" noProof="0" dirty="0" err="1" smtClean="0"/>
+              <a:t>runMine</a:t>
+            </a:r>
+            <a:r>
+              <a:rPr lang="en-US" sz="2800" noProof="0" dirty="0" smtClean="0"/>
+              <a:t>(string)</a:t>
+            </a:r>
+          </a:p>
+          <a:p>
+            <a:pPr marL="342900" marR="0" lvl="0" indent="-342900" algn="l" defTabSz="914400" rtl="0" eaLnBrk="1" fontAlgn="auto" latinLnBrk="0" hangingPunct="1">
+              <a:lnSpc>
+                <a:spcPct val="100000"/>
+              </a:lnSpc>
+              <a:spcBef>
+                <a:spcPct val="20000"/>
+              </a:spcBef>
+              <a:spcAft>
+                <a:spcPts val="0"/>
+              </a:spcAft>
+              <a:buClrTx/>
+              <a:buSzTx/>
+              <a:buFont typeface="Arial" pitchFamily="34" charset="0"/>
+              <a:buNone/>
+              <a:tabLst/>
+              <a:defRPr/>
+            </a:pPr>
+            <a:r>
+              <a:rPr kumimoji="0" lang="en-US" sz="2800" i="0" u="none" strike="noStrike" kern="1200" cap="none" spc="0" normalizeH="0" baseline="0" dirty="0" smtClean="0">
+                <a:ln>
+                  <a:noFill/>
+                </a:ln>
+                <a:solidFill>
+                  <a:schemeClr val="tx1"/>
+                </a:solidFill>
+                <a:effectLst/>
+                <a:uLnTx/>
+                <a:uFillTx/>
+                <a:latin typeface="+mn-lt"/>
+                <a:ea typeface="+mn-ea"/>
+                <a:cs typeface="+mn-cs"/>
+              </a:rPr>
+              <a:t>{</a:t>
+            </a:r>
+          </a:p>
+          <a:p>
+            <a:pPr marL="342900" marR="0" lvl="0" indent="-342900" algn="l" defTabSz="914400" rtl="0" eaLnBrk="1" fontAlgn="auto" latinLnBrk="0" hangingPunct="1">
+              <a:lnSpc>
+                <a:spcPct val="100000"/>
+              </a:lnSpc>
+              <a:spcBef>
+                <a:spcPct val="20000"/>
+              </a:spcBef>
+              <a:spcAft>
+                <a:spcPts val="0"/>
+              </a:spcAft>
+              <a:buClrTx/>
+              <a:buSzTx/>
+              <a:buFont typeface="Arial" pitchFamily="34" charset="0"/>
+              <a:buNone/>
+              <a:tabLst/>
+              <a:defRPr/>
+            </a:pPr>
+            <a:r>
+              <a:rPr lang="en-US" sz="2800" dirty="0" smtClean="0"/>
+              <a:t> </a:t>
+            </a:r>
+            <a:r>
+              <a:rPr lang="en-US" sz="2800" dirty="0" smtClean="0"/>
+              <a:t> # create temporary file</a:t>
+            </a:r>
+          </a:p>
+          <a:p>
+            <a:pPr marL="342900" marR="0" lvl="0" indent="-342900" algn="l" defTabSz="914400" rtl="0" eaLnBrk="1" fontAlgn="auto" latinLnBrk="0" hangingPunct="1">
+              <a:lnSpc>
+                <a:spcPct val="100000"/>
+              </a:lnSpc>
+              <a:spcBef>
+                <a:spcPct val="20000"/>
+              </a:spcBef>
+              <a:spcAft>
+                <a:spcPts val="0"/>
+              </a:spcAft>
+              <a:buClrTx/>
+              <a:buSzTx/>
+              <a:buFont typeface="Arial" pitchFamily="34" charset="0"/>
+              <a:buNone/>
+              <a:tabLst/>
+              <a:defRPr/>
+            </a:pPr>
+            <a:r>
+              <a:rPr kumimoji="0" lang="en-US" sz="2800" i="0" u="none" strike="noStrike" kern="1200" cap="none" spc="0" normalizeH="0" baseline="0" dirty="0" smtClean="0">
+                <a:ln>
+                  <a:noFill/>
+                </a:ln>
+                <a:solidFill>
+                  <a:schemeClr val="tx1"/>
+                </a:solidFill>
+                <a:effectLst/>
+                <a:uLnTx/>
+                <a:uFillTx/>
+                <a:latin typeface="+mn-lt"/>
+                <a:ea typeface="+mn-ea"/>
+                <a:cs typeface="+mn-cs"/>
+              </a:rPr>
+              <a:t> </a:t>
+            </a:r>
+            <a:r>
+              <a:rPr kumimoji="0" lang="en-US" sz="2800" i="0" u="none" strike="noStrike" kern="1200" cap="none" spc="0" normalizeH="0" baseline="0" dirty="0" smtClean="0">
+                <a:ln>
+                  <a:noFill/>
+                </a:ln>
+                <a:solidFill>
+                  <a:schemeClr val="tx1"/>
+                </a:solidFill>
+                <a:effectLst/>
+                <a:uLnTx/>
+                <a:uFillTx/>
+                <a:latin typeface="+mn-lt"/>
+                <a:ea typeface="+mn-ea"/>
+                <a:cs typeface="+mn-cs"/>
+              </a:rPr>
+              <a:t> #</a:t>
+            </a:r>
+            <a:r>
+              <a:rPr kumimoji="0" lang="en-US" sz="2800" i="0" u="none" strike="noStrike" kern="1200" cap="none" spc="0" normalizeH="0" dirty="0" smtClean="0">
+                <a:ln>
+                  <a:noFill/>
+                </a:ln>
+                <a:solidFill>
+                  <a:schemeClr val="tx1"/>
+                </a:solidFill>
+                <a:effectLst/>
+                <a:uLnTx/>
+                <a:uFillTx/>
+                <a:latin typeface="+mn-lt"/>
+                <a:ea typeface="+mn-ea"/>
+                <a:cs typeface="+mn-cs"/>
+              </a:rPr>
+              <a:t> </a:t>
+            </a:r>
+            <a:r>
+              <a:rPr kumimoji="0" lang="en-US" sz="2800" i="0" u="none" strike="noStrike" kern="1200" cap="none" spc="0" normalizeH="0" baseline="0" dirty="0" smtClean="0">
+                <a:ln>
+                  <a:noFill/>
+                </a:ln>
+                <a:solidFill>
+                  <a:schemeClr val="tx1"/>
+                </a:solidFill>
+                <a:effectLst/>
+                <a:uLnTx/>
+                <a:uFillTx/>
+                <a:latin typeface="+mn-lt"/>
+                <a:ea typeface="+mn-ea"/>
+                <a:cs typeface="+mn-cs"/>
+              </a:rPr>
+              <a:t>write string to file</a:t>
+            </a:r>
+          </a:p>
+          <a:p>
+            <a:pPr marL="342900" marR="0" lvl="0" indent="-342900" algn="l" defTabSz="914400" rtl="0" eaLnBrk="1" fontAlgn="auto" latinLnBrk="0" hangingPunct="1">
+              <a:lnSpc>
+                <a:spcPct val="100000"/>
+              </a:lnSpc>
+              <a:spcBef>
+                <a:spcPct val="20000"/>
+              </a:spcBef>
+              <a:spcAft>
+                <a:spcPts val="0"/>
+              </a:spcAft>
+              <a:buClrTx/>
+              <a:buSzTx/>
+              <a:buFont typeface="Arial" pitchFamily="34" charset="0"/>
+              <a:buNone/>
+              <a:tabLst/>
+              <a:defRPr/>
+            </a:pPr>
+            <a:r>
+              <a:rPr lang="en-US" sz="2800" dirty="0" smtClean="0"/>
+              <a:t> </a:t>
+            </a:r>
+            <a:r>
+              <a:rPr lang="en-US" sz="2800" dirty="0" smtClean="0"/>
+              <a:t> # run minesweeper.py with temp file</a:t>
+            </a:r>
+          </a:p>
+          <a:p>
+            <a:pPr marL="342900" marR="0" lvl="0" indent="-342900" algn="l" defTabSz="914400" rtl="0" eaLnBrk="1" fontAlgn="auto" latinLnBrk="0" hangingPunct="1">
+              <a:lnSpc>
+                <a:spcPct val="100000"/>
+              </a:lnSpc>
+              <a:spcBef>
+                <a:spcPct val="20000"/>
+              </a:spcBef>
+              <a:spcAft>
+                <a:spcPts val="0"/>
+              </a:spcAft>
+              <a:buClrTx/>
+              <a:buSzTx/>
+              <a:buFont typeface="Arial" pitchFamily="34" charset="0"/>
+              <a:buNone/>
+              <a:tabLst/>
+              <a:defRPr/>
+            </a:pPr>
+            <a:r>
+              <a:rPr kumimoji="0" lang="en-US" sz="2800" i="0" u="none" strike="noStrike" kern="1200" cap="none" spc="0" normalizeH="0" dirty="0" smtClean="0">
+                <a:ln>
+                  <a:noFill/>
+                </a:ln>
+                <a:solidFill>
+                  <a:schemeClr val="tx1"/>
+                </a:solidFill>
+                <a:effectLst/>
+                <a:uLnTx/>
+                <a:uFillTx/>
+                <a:latin typeface="+mn-lt"/>
+                <a:ea typeface="+mn-ea"/>
+                <a:cs typeface="+mn-cs"/>
+              </a:rPr>
+              <a:t> </a:t>
+            </a:r>
+            <a:r>
+              <a:rPr kumimoji="0" lang="en-US" sz="2800" i="0" u="none" strike="noStrike" kern="1200" cap="none" spc="0" normalizeH="0" dirty="0" smtClean="0">
+                <a:ln>
+                  <a:noFill/>
+                </a:ln>
+                <a:solidFill>
+                  <a:schemeClr val="tx1"/>
+                </a:solidFill>
+                <a:effectLst/>
+                <a:uLnTx/>
+                <a:uFillTx/>
+                <a:latin typeface="+mn-lt"/>
+                <a:ea typeface="+mn-ea"/>
+                <a:cs typeface="+mn-cs"/>
+              </a:rPr>
+              <a:t> # capture </a:t>
+            </a:r>
+            <a:r>
+              <a:rPr kumimoji="0" lang="en-US" sz="2800" i="0" u="none" strike="noStrike" kern="1200" cap="none" spc="0" normalizeH="0" dirty="0" err="1" smtClean="0">
+                <a:ln>
+                  <a:noFill/>
+                </a:ln>
+                <a:solidFill>
+                  <a:schemeClr val="tx1"/>
+                </a:solidFill>
+                <a:effectLst/>
+                <a:uLnTx/>
+                <a:uFillTx/>
+                <a:latin typeface="+mn-lt"/>
+                <a:ea typeface="+mn-ea"/>
+                <a:cs typeface="+mn-cs"/>
+              </a:rPr>
+              <a:t>stdout</a:t>
+            </a:r>
+            <a:endParaRPr kumimoji="0" lang="en-US" sz="2800" i="0" u="none" strike="noStrike" kern="1200" cap="none" spc="0" normalizeH="0" dirty="0" smtClean="0">
+              <a:ln>
+                <a:noFill/>
+              </a:ln>
+              <a:solidFill>
+                <a:schemeClr val="tx1"/>
+              </a:solidFill>
+              <a:effectLst/>
+              <a:uLnTx/>
+              <a:uFillTx/>
+              <a:latin typeface="+mn-lt"/>
+              <a:ea typeface="+mn-ea"/>
+              <a:cs typeface="+mn-cs"/>
+            </a:endParaRPr>
+          </a:p>
+          <a:p>
+            <a:pPr marL="342900" marR="0" lvl="0" indent="-342900" algn="l" defTabSz="914400" rtl="0" eaLnBrk="1" fontAlgn="auto" latinLnBrk="0" hangingPunct="1">
+              <a:lnSpc>
+                <a:spcPct val="100000"/>
+              </a:lnSpc>
+              <a:spcBef>
+                <a:spcPct val="20000"/>
+              </a:spcBef>
+              <a:spcAft>
+                <a:spcPts val="0"/>
+              </a:spcAft>
+              <a:buClrTx/>
+              <a:buSzTx/>
+              <a:buFont typeface="Arial" pitchFamily="34" charset="0"/>
+              <a:buNone/>
+              <a:tabLst/>
+              <a:defRPr/>
+            </a:pPr>
+            <a:r>
+              <a:rPr lang="en-US" sz="2800" dirty="0" smtClean="0"/>
+              <a:t> </a:t>
+            </a:r>
+            <a:r>
+              <a:rPr lang="en-US" sz="2800" dirty="0" smtClean="0"/>
+              <a:t> return </a:t>
+            </a:r>
+            <a:r>
+              <a:rPr lang="en-US" sz="2800" dirty="0" err="1" smtClean="0"/>
+              <a:t>stdout</a:t>
+            </a:r>
+            <a:endParaRPr kumimoji="0" lang="en-US" sz="2800" i="0" u="none" strike="noStrike" kern="1200" cap="none" spc="0" normalizeH="0" baseline="0" dirty="0" smtClean="0">
+              <a:ln>
+                <a:noFill/>
+              </a:ln>
+              <a:solidFill>
+                <a:schemeClr val="tx1"/>
+              </a:solidFill>
+              <a:effectLst/>
+              <a:uLnTx/>
+              <a:uFillTx/>
+              <a:latin typeface="+mn-lt"/>
+              <a:ea typeface="+mn-ea"/>
+              <a:cs typeface="+mn-cs"/>
+            </a:endParaRPr>
+          </a:p>
+          <a:p>
+            <a:pPr marL="342900" marR="0" lvl="0" indent="-342900" algn="l" defTabSz="914400" rtl="0" eaLnBrk="1" fontAlgn="auto" latinLnBrk="0" hangingPunct="1">
+              <a:lnSpc>
+                <a:spcPct val="100000"/>
+              </a:lnSpc>
+              <a:spcBef>
+                <a:spcPct val="20000"/>
+              </a:spcBef>
+              <a:spcAft>
+                <a:spcPts val="0"/>
+              </a:spcAft>
+              <a:buClrTx/>
+              <a:buSzTx/>
+              <a:buFont typeface="Arial" pitchFamily="34" charset="0"/>
+              <a:buNone/>
+              <a:tabLst/>
+              <a:defRPr/>
+            </a:pPr>
+            <a:r>
+              <a:rPr lang="en-US" sz="2800" noProof="0" dirty="0" smtClean="0"/>
+              <a:t>}</a:t>
+            </a:r>
+            <a:endParaRPr kumimoji="0" lang="en-US" sz="2800" i="0" u="none" strike="noStrike" kern="1200" cap="none" spc="0" normalizeH="0" baseline="0" noProof="0" dirty="0" smtClean="0">
+              <a:ln>
+                <a:noFill/>
+              </a:ln>
+              <a:solidFill>
+                <a:schemeClr val="tx1"/>
+              </a:solidFill>
+              <a:effectLst/>
+              <a:uLnTx/>
+              <a:uFillTx/>
+              <a:latin typeface="+mn-lt"/>
+              <a:ea typeface="+mn-ea"/>
+              <a:cs typeface="+mn-cs"/>
+            </a:endParaRPr>
+          </a:p>
+        </p:txBody>
+      </p:sp>
+    </p:spTree>
+  </p:cSld>
+  <p:clrMapOvr>
+    <a:masterClrMapping/>
+  </p:clrMapOvr>
+  <p:transition/>
+  <p:timing>
+    <p:tnLst>
+      <p:par>
+        <p:cTn id="1" dur="indefinite" restart="never" nodeType="tmRoot"/>
+      </p:par>
+    </p:tnLst>
+  </p:timing>
+</p:sld>
+</file>
+
+<file path=ppt/slides/slide13.xml><?xml version="1.0" encoding="utf-8"?>
 <p:sld xmlns:a="http://schemas.openxmlformats.org/drawingml/2006/main" xmlns:r="http://schemas.openxmlformats.org/officeDocument/2006/relationships" xmlns:p="http://schemas.openxmlformats.org/presentationml/2006/main">
   <p:cSld>
     <p:spTree>
@@ -3337,6 +5167,188 @@
           <a:p>
             <a:r>
               <a:rPr lang="en-US" dirty="0" smtClean="0"/>
+              <a:t>Test Cases</a:t>
+            </a:r>
+            <a:endParaRPr lang="en-US" dirty="0"/>
+          </a:p>
+        </p:txBody>
+      </p:sp>
+      <p:sp>
+        <p:nvSpPr>
+          <p:cNvPr id="3" name="Content Placeholder 2"/>
+          <p:cNvSpPr>
+            <a:spLocks noGrp="1"/>
+          </p:cNvSpPr>
+          <p:nvPr>
+            <p:ph idx="1"/>
+          </p:nvPr>
+        </p:nvSpPr>
+        <p:spPr/>
+        <p:txBody>
+          <a:bodyPr/>
+          <a:lstStyle/>
+          <a:p>
+            <a:pPr>
+              <a:buNone/>
+            </a:pPr>
+            <a:r>
+              <a:rPr lang="en-US" dirty="0" smtClean="0"/>
+              <a:t>Good test cases for minesweeper</a:t>
+            </a:r>
+          </a:p>
+          <a:p>
+            <a:pPr>
+              <a:buNone/>
+            </a:pPr>
+            <a:endParaRPr lang="en-US" dirty="0"/>
+          </a:p>
+        </p:txBody>
+      </p:sp>
+    </p:spTree>
+  </p:cSld>
+  <p:clrMapOvr>
+    <a:masterClrMapping/>
+  </p:clrMapOvr>
+  <p:timing>
+    <p:tnLst>
+      <p:par>
+        <p:cTn id="1" dur="indefinite" restart="never" nodeType="tmRoot"/>
+      </p:par>
+    </p:tnLst>
+  </p:timing>
+</p:sld>
+</file>
+
+<file path=ppt/slides/slide14.xml><?xml version="1.0" encoding="utf-8"?>
+<p:sld xmlns:a="http://schemas.openxmlformats.org/drawingml/2006/main" xmlns:r="http://schemas.openxmlformats.org/officeDocument/2006/relationships" xmlns:p="http://schemas.openxmlformats.org/presentationml/2006/main">
+  <p:cSld>
+    <p:spTree>
+      <p:nvGrpSpPr>
+        <p:cNvPr id="1" name=""/>
+        <p:cNvGrpSpPr/>
+        <p:nvPr/>
+      </p:nvGrpSpPr>
+      <p:grpSpPr>
+        <a:xfrm>
+          <a:off x="0" y="0"/>
+          <a:ext cx="0" cy="0"/>
+          <a:chOff x="0" y="0"/>
+          <a:chExt cx="0" cy="0"/>
+        </a:xfrm>
+      </p:grpSpPr>
+      <p:sp>
+        <p:nvSpPr>
+          <p:cNvPr id="2" name="Title 1"/>
+          <p:cNvSpPr>
+            <a:spLocks noGrp="1"/>
+          </p:cNvSpPr>
+          <p:nvPr>
+            <p:ph type="title"/>
+          </p:nvPr>
+        </p:nvSpPr>
+        <p:spPr/>
+        <p:txBody>
+          <a:bodyPr/>
+          <a:lstStyle/>
+          <a:p>
+            <a:r>
+              <a:rPr lang="en-US" dirty="0" smtClean="0"/>
+              <a:t>Implement Tests</a:t>
+            </a:r>
+            <a:endParaRPr lang="en-US" dirty="0"/>
+          </a:p>
+        </p:txBody>
+      </p:sp>
+      <p:sp>
+        <p:nvSpPr>
+          <p:cNvPr id="3" name="Content Placeholder 2"/>
+          <p:cNvSpPr>
+            <a:spLocks noGrp="1"/>
+          </p:cNvSpPr>
+          <p:nvPr>
+            <p:ph idx="1"/>
+          </p:nvPr>
+        </p:nvSpPr>
+        <p:spPr/>
+        <p:txBody>
+          <a:bodyPr/>
+          <a:lstStyle/>
+          <a:p>
+            <a:r>
+              <a:rPr lang="en-US" dirty="0" smtClean="0"/>
+              <a:t>Write your own software </a:t>
+            </a:r>
+            <a:r>
+              <a:rPr lang="en-US" dirty="0" err="1" smtClean="0"/>
+              <a:t>api</a:t>
+            </a:r>
+            <a:r>
+              <a:rPr lang="en-US" dirty="0" smtClean="0"/>
+              <a:t> adaptor</a:t>
+            </a:r>
+          </a:p>
+          <a:p>
+            <a:r>
+              <a:rPr lang="en-US" dirty="0" smtClean="0"/>
+              <a:t>Add tests </a:t>
+            </a:r>
+            <a:r>
+              <a:rPr lang="en-US" dirty="0" smtClean="0"/>
+              <a:t>for </a:t>
+            </a:r>
+            <a:r>
+              <a:rPr lang="en-US" dirty="0" smtClean="0"/>
+              <a:t>minesweeper</a:t>
+            </a:r>
+            <a:endParaRPr lang="en-US" dirty="0" smtClean="0"/>
+          </a:p>
+          <a:p>
+            <a:endParaRPr lang="en-US" dirty="0"/>
+          </a:p>
+        </p:txBody>
+      </p:sp>
+    </p:spTree>
+  </p:cSld>
+  <p:clrMapOvr>
+    <a:masterClrMapping/>
+  </p:clrMapOvr>
+</p:sld>
+</file>
+
+<file path=ppt/slides/slide15.xml><?xml version="1.0" encoding="utf-8"?>
+<p:sld xmlns:a="http://schemas.openxmlformats.org/drawingml/2006/main" xmlns:r="http://schemas.openxmlformats.org/officeDocument/2006/relationships" xmlns:p="http://schemas.openxmlformats.org/presentationml/2006/main">
+  <p:cSld>
+    <p:spTree>
+      <p:nvGrpSpPr>
+        <p:cNvPr id="1" name=""/>
+        <p:cNvGrpSpPr/>
+        <p:nvPr/>
+      </p:nvGrpSpPr>
+      <p:grpSpPr>
+        <a:xfrm>
+          <a:off x="0" y="0"/>
+          <a:ext cx="0" cy="0"/>
+          <a:chOff x="0" y="0"/>
+          <a:chExt cx="0" cy="0"/>
+        </a:xfrm>
+      </p:grpSpPr>
+      <p:sp>
+        <p:nvSpPr>
+          <p:cNvPr id="2" name="Title 1"/>
+          <p:cNvSpPr>
+            <a:spLocks noGrp="1"/>
+          </p:cNvSpPr>
+          <p:nvPr>
+            <p:ph type="title"/>
+          </p:nvPr>
+        </p:nvSpPr>
+        <p:spPr/>
+        <p:txBody>
+          <a:bodyPr/>
+          <a:lstStyle/>
+          <a:p>
+            <a:r>
+              <a:rPr lang="en-US" dirty="0" smtClean="0"/>
               <a:t>Retrospective</a:t>
             </a:r>
             <a:endParaRPr lang="en-US" dirty="0"/>
@@ -3371,21 +5383,6 @@
               <a:buNone/>
             </a:pPr>
             <a:endParaRPr lang="en-US" dirty="0" smtClean="0"/>
-          </a:p>
-          <a:p>
-            <a:pPr>
-              <a:buNone/>
-            </a:pPr>
-            <a:endParaRPr lang="en-US" dirty="0" smtClean="0"/>
-          </a:p>
-          <a:p>
-            <a:pPr>
-              <a:buNone/>
-            </a:pPr>
-            <a:r>
-              <a:rPr lang="en-US" dirty="0" smtClean="0"/>
-              <a:t>Did testing help?</a:t>
-            </a:r>
           </a:p>
           <a:p>
             <a:pPr>
@@ -3470,11 +5467,7 @@
             </a:r>
             <a:r>
               <a:rPr lang="en-US" dirty="0" err="1" smtClean="0"/>
-              <a:t>k</a:t>
-            </a:r>
-            <a:r>
-              <a:rPr lang="en-US" dirty="0" err="1" smtClean="0"/>
-              <a:t>ata</a:t>
+              <a:t>kata</a:t>
             </a:r>
             <a:endParaRPr lang="en-US" dirty="0" smtClean="0"/>
           </a:p>
@@ -3482,7 +5475,7 @@
             <a:pPr lvl="1"/>
             <a:r>
               <a:rPr lang="en-US" dirty="0" smtClean="0"/>
-              <a:t>Talk about </a:t>
+              <a:t>Explain </a:t>
             </a:r>
             <a:r>
               <a:rPr lang="en-US" dirty="0" err="1" smtClean="0"/>
@@ -3509,7 +5502,15 @@
             <a:pPr lvl="1"/>
             <a:r>
               <a:rPr lang="en-US" dirty="0" smtClean="0"/>
-              <a:t>Some people show and talk their implementation</a:t>
+              <a:t>Some people show and talk </a:t>
+            </a:r>
+            <a:r>
+              <a:rPr lang="en-US" dirty="0" smtClean="0"/>
+              <a:t>about their </a:t>
+            </a:r>
+            <a:r>
+              <a:rPr lang="en-US" dirty="0" smtClean="0"/>
+              <a:t>implementation</a:t>
             </a:r>
           </a:p>
           <a:p>
@@ -3528,22 +5529,9 @@
           <a:p>
             <a:r>
               <a:rPr lang="en-US" dirty="0" smtClean="0"/>
-              <a:t>Possible other </a:t>
-            </a:r>
-            <a:r>
-              <a:rPr lang="en-US" dirty="0" err="1" smtClean="0"/>
-              <a:t>kata</a:t>
-            </a:r>
-            <a:r>
-              <a:rPr lang="en-US" dirty="0" smtClean="0"/>
-              <a:t>???</a:t>
-            </a:r>
-          </a:p>
-          <a:p>
-            <a:r>
-              <a:rPr lang="en-US" dirty="0" smtClean="0"/>
               <a:t>Retrospective</a:t>
             </a:r>
+            <a:endParaRPr lang="en-US" dirty="0" smtClean="0"/>
           </a:p>
           <a:p>
             <a:endParaRPr lang="en-US" dirty="0" smtClean="0"/>
@@ -3895,11 +5883,7 @@
             </a:r>
             <a:r>
               <a:rPr lang="en-US" dirty="0" smtClean="0"/>
-              <a:t> </a:t>
-            </a:r>
-            <a:r>
-              <a:rPr lang="en-US" dirty="0" smtClean="0"/>
-              <a:t>(3)</a:t>
+              <a:t> (3)</a:t>
             </a:r>
             <a:endParaRPr lang="en-US" dirty="0"/>
           </a:p>
@@ -3927,7 +5911,17 @@
           <a:p>
             <a:r>
               <a:rPr lang="en-US" dirty="0" smtClean="0"/>
-              <a:t>Input File</a:t>
+              <a:t>Input </a:t>
+            </a:r>
+            <a:r>
+              <a:rPr lang="en-US" dirty="0" smtClean="0"/>
+              <a:t>File      ------</a:t>
+            </a:r>
+            <a:r>
+              <a:rPr lang="en-US" dirty="0" smtClean="0">
+                <a:sym typeface="Wingdings" pitchFamily="2" charset="2"/>
+              </a:rPr>
+              <a:t>--&gt;</a:t>
             </a:r>
             <a:endParaRPr lang="en-US" dirty="0"/>
           </a:p>
@@ -4345,7 +6339,9 @@
         </p:nvSpPr>
         <p:spPr/>
         <p:txBody>
-          <a:bodyPr/>
+          <a:bodyPr>
+            <a:normAutofit lnSpcReduction="10000"/>
+          </a:bodyPr>
           <a:lstStyle/>
           <a:p>
             <a:r>
@@ -4365,42 +6361,60 @@
               <a:rPr lang="en-US" dirty="0" smtClean="0"/>
               <a:t>Objects and Classes</a:t>
             </a:r>
+          </a:p>
+          <a:p>
+            <a:pPr lvl="1"/>
+            <a:r>
+              <a:rPr lang="en-US" dirty="0" smtClean="0"/>
+              <a:t>Functional style</a:t>
+            </a:r>
+          </a:p>
+          <a:p>
+            <a:pPr lvl="1"/>
+            <a:r>
+              <a:rPr lang="en-US" dirty="0" smtClean="0"/>
+              <a:t>TDD</a:t>
+            </a:r>
+          </a:p>
+          <a:p>
+            <a:pPr lvl="1"/>
+            <a:r>
+              <a:rPr lang="en-US" dirty="0" smtClean="0"/>
+              <a:t>Tests (How to fit in tests?)</a:t>
+            </a:r>
+          </a:p>
+          <a:p>
+            <a:pPr lvl="1"/>
+            <a:r>
+              <a:rPr lang="en-US" dirty="0" smtClean="0"/>
+              <a:t>Test Cases</a:t>
+            </a:r>
+          </a:p>
+          <a:p>
+            <a:pPr lvl="1"/>
+            <a:r>
+              <a:rPr lang="en-US" dirty="0" smtClean="0"/>
+              <a:t>Extensibility (e.g. modify field</a:t>
+            </a:r>
+            <a:r>
+              <a:rPr lang="en-US" dirty="0" smtClean="0"/>
+              <a:t>)</a:t>
+            </a:r>
+          </a:p>
+          <a:p>
+            <a:r>
+              <a:rPr lang="en-US" dirty="0" smtClean="0">
+                <a:hlinkClick r:id="rId2"/>
+              </a:rPr>
+              <a:t>https://</a:t>
+            </a:r>
+            <a:r>
+              <a:rPr lang="en-US" dirty="0" smtClean="0">
+                <a:hlinkClick r:id="rId2"/>
+              </a:rPr>
+              <a:t>github.com/boonth/codingdojo</a:t>
+            </a:r>
             <a:endParaRPr lang="en-US" dirty="0" smtClean="0"/>
-          </a:p>
-          <a:p>
-            <a:pPr lvl="1"/>
-            <a:r>
-              <a:rPr lang="en-US" dirty="0" smtClean="0"/>
-              <a:t>Functional style</a:t>
-            </a:r>
-          </a:p>
-          <a:p>
-            <a:pPr lvl="1"/>
-            <a:r>
-              <a:rPr lang="en-US" dirty="0" smtClean="0"/>
-              <a:t>TDD</a:t>
-            </a:r>
-          </a:p>
-          <a:p>
-            <a:pPr lvl="1"/>
-            <a:r>
-              <a:rPr lang="en-US" dirty="0" smtClean="0"/>
-              <a:t>Tests (How to fit in tests?)</a:t>
-            </a:r>
-          </a:p>
-          <a:p>
-            <a:pPr lvl="1"/>
-            <a:r>
-              <a:rPr lang="en-US" dirty="0" smtClean="0"/>
-              <a:t>Test Cases</a:t>
-            </a:r>
-          </a:p>
-          <a:p>
-            <a:pPr lvl="1"/>
-            <a:r>
-              <a:rPr lang="en-US" dirty="0" smtClean="0"/>
-              <a:t>Extensibility (e.g. modify field)</a:t>
-            </a:r>
           </a:p>
           <a:p>
             <a:pPr lvl="1"/>
@@ -4450,7 +6464,7 @@
           <a:p>
             <a:r>
               <a:rPr lang="en-US" dirty="0" smtClean="0"/>
-              <a:t>Testing</a:t>
+              <a:t>Show and Tell</a:t>
             </a:r>
             <a:endParaRPr lang="en-US" dirty="0"/>
           </a:p>
@@ -4471,28 +6485,14 @@
           <a:bodyPr/>
           <a:lstStyle/>
           <a:p>
-            <a:r>
-              <a:rPr lang="en-US" dirty="0" smtClean="0"/>
-              <a:t>Input: ???</a:t>
-            </a:r>
-          </a:p>
-          <a:p>
-            <a:r>
-              <a:rPr lang="en-US" dirty="0" smtClean="0"/>
-              <a:t>Output: ???</a:t>
-            </a:r>
-          </a:p>
-          <a:p>
-            <a:endParaRPr lang="en-US" dirty="0" smtClean="0"/>
-          </a:p>
-          <a:p>
-            <a:r>
-              <a:rPr lang="en-US" dirty="0" smtClean="0"/>
-              <a:t>How do we test this?</a:t>
-            </a:r>
-          </a:p>
-          <a:p>
-            <a:endParaRPr lang="en-US" dirty="0" smtClean="0"/>
+            <a:pPr algn="ctr">
+              <a:buNone/>
+            </a:pPr>
+            <a:r>
+              <a:rPr lang="en-US" dirty="0" smtClean="0"/>
+              <a:t>Show and explain your code</a:t>
+            </a:r>
+            <a:endParaRPr lang="en-US" dirty="0"/>
           </a:p>
         </p:txBody>
       </p:sp>
@@ -4538,7 +6538,7 @@
           <a:p>
             <a:r>
               <a:rPr lang="en-US" dirty="0" smtClean="0"/>
-              <a:t>Software API Adaptor</a:t>
+              <a:t>Testing</a:t>
             </a:r>
             <a:endParaRPr lang="en-US" dirty="0"/>
           </a:p>
@@ -4559,7 +6559,28 @@
           <a:bodyPr/>
           <a:lstStyle/>
           <a:p>
-            <a:endParaRPr lang="en-US"/>
+            <a:r>
+              <a:rPr lang="en-US" dirty="0" smtClean="0"/>
+              <a:t>Input: ???</a:t>
+            </a:r>
+          </a:p>
+          <a:p>
+            <a:r>
+              <a:rPr lang="en-US" dirty="0" smtClean="0"/>
+              <a:t>Output: ???</a:t>
+            </a:r>
+          </a:p>
+          <a:p>
+            <a:endParaRPr lang="en-US" dirty="0" smtClean="0"/>
+          </a:p>
+          <a:p>
+            <a:r>
+              <a:rPr lang="en-US" dirty="0" smtClean="0"/>
+              <a:t>How do we test this?</a:t>
+            </a:r>
+          </a:p>
+          <a:p>
+            <a:endParaRPr lang="en-US" dirty="0" smtClean="0"/>
           </a:p>
         </p:txBody>
       </p:sp>
@@ -4852,4 +6873,287 @@
   <a:objectDefaults/>
   <a:extraClrSchemeLst/>
 </a:theme>
+</file>
+
+<file path=ppt/theme/theme2.xml><?xml version="1.0" encoding="utf-8"?>
+<a:theme xmlns:a="http://schemas.openxmlformats.org/drawingml/2006/main" name="Office Theme">
+  <a:themeElements>
+    <a:clrScheme name="Office">
+      <a:dk1>
+        <a:sysClr val="windowText" lastClr="000000"/>
+      </a:dk1>
+      <a:lt1>
+        <a:sysClr val="window" lastClr="FFFFFF"/>
+      </a:lt1>
+      <a:dk2>
+        <a:srgbClr val="1F497D"/>
+      </a:dk2>
+      <a:lt2>
+        <a:srgbClr val="EEECE1"/>
+      </a:lt2>
+      <a:accent1>
+        <a:srgbClr val="4F81BD"/>
+      </a:accent1>
+      <a:accent2>
+        <a:srgbClr val="C0504D"/>
+      </a:accent2>
+      <a:accent3>
+        <a:srgbClr val="9BBB59"/>
+      </a:accent3>
+      <a:accent4>
+        <a:srgbClr val="8064A2"/>
+      </a:accent4>
+      <a:accent5>
+        <a:srgbClr val="4BACC6"/>
+      </a:accent5>
+      <a:accent6>
+        <a:srgbClr val="F79646"/>
+      </a:accent6>
+      <a:hlink>
+        <a:srgbClr val="0000FF"/>
+      </a:hlink>
+      <a:folHlink>
+        <a:srgbClr val="800080"/>
+      </a:folHlink>
+    </a:clrScheme>
+    <a:fontScheme name="Office">
+      <a:majorFont>
+        <a:latin typeface="Calibri"/>
+        <a:ea typeface=""/>
+        <a:cs typeface=""/>
+        <a:font script="Jpan" typeface="ＭＳ Ｐゴシック"/>
+        <a:font script="Hang" typeface="맑은 고딕"/>
+        <a:font script="Hans" typeface="宋体"/>
+        <a:font script="Hant" typeface="新細明體"/>
+        <a:font script="Arab" typeface="Times New Roman"/>
+        <a:font script="Hebr" typeface="Times New Roman"/>
+        <a:font script="Thai" typeface="Angsana New"/>
+        <a:font script="Ethi" typeface="Nyala"/>
+        <a:font script="Beng" typeface="Vrinda"/>
+        <a:font script="Gujr" typeface="Shruti"/>
+        <a:font script="Khmr" typeface="MoolBoran"/>
+        <a:font script="Knda" typeface="Tunga"/>
+        <a:font script="Guru" typeface="Raavi"/>
+        <a:font script="Cans" typeface="Euphemia"/>
+        <a:font script="Cher" typeface="Plantagenet Cherokee"/>
+        <a:font script="Yiii" typeface="Microsoft Yi Baiti"/>
+        <a:font script="Tibt" typeface="Microsoft Himalaya"/>
+        <a:font script="Thaa" typeface="MV Boli"/>
+        <a:font script="Deva" typeface="Mangal"/>
+        <a:font script="Telu" typeface="Gautami"/>
+        <a:font script="Taml" typeface="Latha"/>
+        <a:font script="Syrc" typeface="Estrangelo Edessa"/>
+        <a:font script="Orya" typeface="Kalinga"/>
+        <a:font script="Mlym" typeface="Kartika"/>
+        <a:font script="Laoo" typeface="DokChampa"/>
+        <a:font script="Sinh" typeface="Iskoola Pota"/>
+        <a:font script="Mong" typeface="Mongolian Baiti"/>
+        <a:font script="Viet" typeface="Times New Roman"/>
+        <a:font script="Uigh" typeface="Microsoft Uighur"/>
+      </a:majorFont>
+      <a:minorFont>
+        <a:latin typeface="Calibri"/>
+        <a:ea typeface=""/>
+        <a:cs typeface=""/>
+        <a:font script="Jpan" typeface="ＭＳ Ｐゴシック"/>
+        <a:font script="Hang" typeface="맑은 고딕"/>
+        <a:font script="Hans" typeface="宋体"/>
+        <a:font script="Hant" typeface="新細明體"/>
+        <a:font script="Arab" typeface="Arial"/>
+        <a:font script="Hebr" typeface="Arial"/>
+        <a:font script="Thai" typeface="Cordia New"/>
+        <a:font script="Ethi" typeface="Nyala"/>
+        <a:font script="Beng" typeface="Vrinda"/>
+        <a:font script="Gujr" typeface="Shruti"/>
+        <a:font script="Khmr" typeface="DaunPenh"/>
+        <a:font script="Knda" typeface="Tunga"/>
+        <a:font script="Guru" typeface="Raavi"/>
+        <a:font script="Cans" typeface="Euphemia"/>
+        <a:font script="Cher" typeface="Plantagenet Cherokee"/>
+        <a:font script="Yiii" typeface="Microsoft Yi Baiti"/>
+        <a:font script="Tibt" typeface="Microsoft Himalaya"/>
+        <a:font script="Thaa" typeface="MV Boli"/>
+        <a:font script="Deva" typeface="Mangal"/>
+        <a:font script="Telu" typeface="Gautami"/>
+        <a:font script="Taml" typeface="Latha"/>
+        <a:font script="Syrc" typeface="Estrangelo Edessa"/>
+        <a:font script="Orya" typeface="Kalinga"/>
+        <a:font script="Mlym" typeface="Kartika"/>
+        <a:font script="Laoo" typeface="DokChampa"/>
+        <a:font script="Sinh" typeface="Iskoola Pota"/>
+        <a:font script="Mong" typeface="Mongolian Baiti"/>
+        <a:font script="Viet" typeface="Arial"/>
+        <a:font script="Uigh" typeface="Microsoft Uighur"/>
+      </a:minorFont>
+    </a:fontScheme>
+    <a:fmtScheme name="Office">
+      <a:fillStyleLst>
+        <a:solidFill>
+          <a:schemeClr val="phClr"/>
+        </a:solidFill>
+        <a:gradFill rotWithShape="1">
+          <a:gsLst>
+            <a:gs pos="0">
+              <a:schemeClr val="phClr">
+                <a:tint val="50000"/>
+                <a:satMod val="300000"/>
+              </a:schemeClr>
+            </a:gs>
+            <a:gs pos="35000">
+              <a:schemeClr val="phClr">
+                <a:tint val="37000"/>
+                <a:satMod val="300000"/>
+              </a:schemeClr>
+            </a:gs>
+            <a:gs pos="100000">
+              <a:schemeClr val="phClr">
+                <a:tint val="15000"/>
+                <a:satMod val="350000"/>
+              </a:schemeClr>
+            </a:gs>
+          </a:gsLst>
+          <a:lin ang="16200000" scaled="1"/>
+        </a:gradFill>
+        <a:gradFill rotWithShape="1">
+          <a:gsLst>
+            <a:gs pos="0">
+              <a:schemeClr val="phClr">
+                <a:shade val="51000"/>
+                <a:satMod val="130000"/>
+              </a:schemeClr>
+            </a:gs>
+            <a:gs pos="80000">
+              <a:schemeClr val="phClr">
+                <a:shade val="93000"/>
+                <a:satMod val="130000"/>
+              </a:schemeClr>
+            </a:gs>
+            <a:gs pos="100000">
+              <a:schemeClr val="phClr">
+                <a:shade val="94000"/>
+                <a:satMod val="135000"/>
+              </a:schemeClr>
+            </a:gs>
+          </a:gsLst>
+          <a:lin ang="16200000" scaled="0"/>
+        </a:gradFill>
+      </a:fillStyleLst>
+      <a:lnStyleLst>
+        <a:ln w="9525" cap="flat" cmpd="sng" algn="ctr">
+          <a:solidFill>
+            <a:schemeClr val="phClr">
+              <a:shade val="95000"/>
+              <a:satMod val="105000"/>
+            </a:schemeClr>
+          </a:solidFill>
+          <a:prstDash val="solid"/>
+        </a:ln>
+        <a:ln w="25400" cap="flat" cmpd="sng" algn="ctr">
+          <a:solidFill>
+            <a:schemeClr val="phClr"/>
+          </a:solidFill>
+          <a:prstDash val="solid"/>
+        </a:ln>
+        <a:ln w="38100" cap="flat" cmpd="sng" algn="ctr">
+          <a:solidFill>
+            <a:schemeClr val="phClr"/>
+          </a:solidFill>
+          <a:prstDash val="solid"/>
+        </a:ln>
+      </a:lnStyleLst>
+      <a:effectStyleLst>
+        <a:effectStyle>
+          <a:effectLst>
+            <a:outerShdw blurRad="40000" dist="20000" dir="5400000" rotWithShape="0">
+              <a:srgbClr val="000000">
+                <a:alpha val="38000"/>
+              </a:srgbClr>
+            </a:outerShdw>
+          </a:effectLst>
+        </a:effectStyle>
+        <a:effectStyle>
+          <a:effectLst>
+            <a:outerShdw blurRad="40000" dist="23000" dir="5400000" rotWithShape="0">
+              <a:srgbClr val="000000">
+                <a:alpha val="35000"/>
+              </a:srgbClr>
+            </a:outerShdw>
+          </a:effectLst>
+        </a:effectStyle>
+        <a:effectStyle>
+          <a:effectLst>
+            <a:outerShdw blurRad="40000" dist="23000" dir="5400000" rotWithShape="0">
+              <a:srgbClr val="000000">
+                <a:alpha val="35000"/>
+              </a:srgbClr>
+            </a:outerShdw>
+          </a:effectLst>
+          <a:scene3d>
+            <a:camera prst="orthographicFront">
+              <a:rot lat="0" lon="0" rev="0"/>
+            </a:camera>
+            <a:lightRig rig="threePt" dir="t">
+              <a:rot lat="0" lon="0" rev="1200000"/>
+            </a:lightRig>
+          </a:scene3d>
+          <a:sp3d>
+            <a:bevelT w="63500" h="25400"/>
+          </a:sp3d>
+        </a:effectStyle>
+      </a:effectStyleLst>
+      <a:bgFillStyleLst>
+        <a:solidFill>
+          <a:schemeClr val="phClr"/>
+        </a:solidFill>
+        <a:gradFill rotWithShape="1">
+          <a:gsLst>
+            <a:gs pos="0">
+              <a:schemeClr val="phClr">
+                <a:tint val="40000"/>
+                <a:satMod val="350000"/>
+              </a:schemeClr>
+            </a:gs>
+            <a:gs pos="40000">
+              <a:schemeClr val="phClr">
+                <a:tint val="45000"/>
+                <a:shade val="99000"/>
+                <a:satMod val="350000"/>
+              </a:schemeClr>
+            </a:gs>
+            <a:gs pos="100000">
+              <a:schemeClr val="phClr">
+                <a:shade val="20000"/>
+                <a:satMod val="255000"/>
+              </a:schemeClr>
+            </a:gs>
+          </a:gsLst>
+          <a:path path="circle">
+            <a:fillToRect l="50000" t="-80000" r="50000" b="180000"/>
+          </a:path>
+        </a:gradFill>
+        <a:gradFill rotWithShape="1">
+          <a:gsLst>
+            <a:gs pos="0">
+              <a:schemeClr val="phClr">
+                <a:tint val="80000"/>
+                <a:satMod val="300000"/>
+              </a:schemeClr>
+            </a:gs>
+            <a:gs pos="100000">
+              <a:schemeClr val="phClr">
+                <a:shade val="30000"/>
+                <a:satMod val="200000"/>
+              </a:schemeClr>
+            </a:gs>
+          </a:gsLst>
+          <a:path path="circle">
+            <a:fillToRect l="50000" t="50000" r="50000" b="50000"/>
+          </a:path>
+        </a:gradFill>
+      </a:bgFillStyleLst>
+    </a:fmtScheme>
+  </a:themeElements>
+  <a:objectDefaults/>
+  <a:extraClrSchemeLst/>
+</a:theme>
 </file>
</xml_diff>